<commit_message>
5-th lection added with DB initialization script.
</commit_message>
<xml_diff>
--- a/sql/lectures/5_select_subqueries.pptx
+++ b/sql/lectures/5_select_subqueries.pptx
@@ -15,6 +15,28 @@
     <p:sldId id="263" r:id="rId9"/>
     <p:sldId id="264" r:id="rId10"/>
     <p:sldId id="265" r:id="rId11"/>
+    <p:sldId id="267" r:id="rId12"/>
+    <p:sldId id="268" r:id="rId13"/>
+    <p:sldId id="269" r:id="rId14"/>
+    <p:sldId id="287" r:id="rId15"/>
+    <p:sldId id="274" r:id="rId16"/>
+    <p:sldId id="271" r:id="rId17"/>
+    <p:sldId id="272" r:id="rId18"/>
+    <p:sldId id="273" r:id="rId19"/>
+    <p:sldId id="275" r:id="rId20"/>
+    <p:sldId id="276" r:id="rId21"/>
+    <p:sldId id="277" r:id="rId22"/>
+    <p:sldId id="278" r:id="rId23"/>
+    <p:sldId id="279" r:id="rId24"/>
+    <p:sldId id="280" r:id="rId25"/>
+    <p:sldId id="281" r:id="rId26"/>
+    <p:sldId id="282" r:id="rId27"/>
+    <p:sldId id="283" r:id="rId28"/>
+    <p:sldId id="284" r:id="rId29"/>
+    <p:sldId id="285" r:id="rId30"/>
+    <p:sldId id="286" r:id="rId31"/>
+    <p:sldId id="289" r:id="rId32"/>
+    <p:sldId id="288" r:id="rId33"/>
   </p:sldIdLst>
   <p:sldSz cx="9144000" cy="6858000" type="screen4x3"/>
   <p:notesSz cx="6858000" cy="9144000"/>
@@ -113,6 +135,11 @@
       </a:defRPr>
     </a:lvl9pPr>
   </p:defaultTextStyle>
+  <p:extLst>
+    <p:ext uri="{EFAFB233-063F-42B5-8137-9DF3F51BA10A}">
+      <p15:sldGuideLst xmlns:p15="http://schemas.microsoft.com/office/powerpoint/2012/main"/>
+    </p:ext>
+  </p:extLst>
 </p:presentation>
 </file>
 
@@ -330,7 +357,7 @@
             <a:fld id="{B61BEF0D-F0BB-DE4B-95CE-6DB70DBA9567}" type="datetimeFigureOut">
               <a:rPr lang="en-US" smtClean="0"/>
               <a:pPr/>
-              <a:t>9/20/2013</a:t>
+              <a:t>9/21/2013</a:t>
             </a:fld>
             <a:endParaRPr lang="en-US" dirty="0"/>
           </a:p>
@@ -623,7 +650,7 @@
             <a:fld id="{B61BEF0D-F0BB-DE4B-95CE-6DB70DBA9567}" type="datetimeFigureOut">
               <a:rPr lang="en-US" smtClean="0"/>
               <a:pPr/>
-              <a:t>9/20/2013</a:t>
+              <a:t>9/21/2013</a:t>
             </a:fld>
             <a:endParaRPr lang="en-US" dirty="0"/>
           </a:p>
@@ -889,7 +916,7 @@
             <a:fld id="{B61BEF0D-F0BB-DE4B-95CE-6DB70DBA9567}" type="datetimeFigureOut">
               <a:rPr lang="en-US" smtClean="0"/>
               <a:pPr/>
-              <a:t>9/20/2013</a:t>
+              <a:t>9/21/2013</a:t>
             </a:fld>
             <a:endParaRPr lang="en-US" dirty="0"/>
           </a:p>
@@ -1451,7 +1478,7 @@
             <a:fld id="{B61BEF0D-F0BB-DE4B-95CE-6DB70DBA9567}" type="datetimeFigureOut">
               <a:rPr lang="en-US" smtClean="0"/>
               <a:pPr/>
-              <a:t>9/20/2013</a:t>
+              <a:t>9/21/2013</a:t>
             </a:fld>
             <a:endParaRPr lang="en-US" dirty="0"/>
           </a:p>
@@ -1712,7 +1739,7 @@
             <a:fld id="{B61BEF0D-F0BB-DE4B-95CE-6DB70DBA9567}" type="datetimeFigureOut">
               <a:rPr lang="en-US" smtClean="0"/>
               <a:pPr/>
-              <a:t>9/20/2013</a:t>
+              <a:t>9/21/2013</a:t>
             </a:fld>
             <a:endParaRPr lang="en-US" dirty="0"/>
           </a:p>
@@ -2290,7 +2317,7 @@
             <a:fld id="{B61BEF0D-F0BB-DE4B-95CE-6DB70DBA9567}" type="datetimeFigureOut">
               <a:rPr lang="en-US" smtClean="0"/>
               <a:pPr/>
-              <a:t>9/20/2013</a:t>
+              <a:t>9/21/2013</a:t>
             </a:fld>
             <a:endParaRPr lang="en-US" dirty="0"/>
           </a:p>
@@ -2624,7 +2651,7 @@
             <a:fld id="{B61BEF0D-F0BB-DE4B-95CE-6DB70DBA9567}" type="datetimeFigureOut">
               <a:rPr lang="en-US" smtClean="0"/>
               <a:pPr/>
-              <a:t>9/20/2013</a:t>
+              <a:t>9/21/2013</a:t>
             </a:fld>
             <a:endParaRPr lang="en-US" dirty="0"/>
           </a:p>
@@ -2801,7 +2828,7 @@
             <a:fld id="{B61BEF0D-F0BB-DE4B-95CE-6DB70DBA9567}" type="datetimeFigureOut">
               <a:rPr lang="en-US" smtClean="0"/>
               <a:pPr/>
-              <a:t>9/20/2013</a:t>
+              <a:t>9/21/2013</a:t>
             </a:fld>
             <a:endParaRPr lang="en-US" dirty="0"/>
           </a:p>
@@ -2983,7 +3010,7 @@
             <a:fld id="{B61BEF0D-F0BB-DE4B-95CE-6DB70DBA9567}" type="datetimeFigureOut">
               <a:rPr lang="en-US" smtClean="0"/>
               <a:pPr/>
-              <a:t>9/20/2013</a:t>
+              <a:t>9/21/2013</a:t>
             </a:fld>
             <a:endParaRPr lang="en-US" dirty="0"/>
           </a:p>
@@ -3155,7 +3182,7 @@
             <a:fld id="{B61BEF0D-F0BB-DE4B-95CE-6DB70DBA9567}" type="datetimeFigureOut">
               <a:rPr lang="en-US" smtClean="0"/>
               <a:pPr/>
-              <a:t>9/20/2013</a:t>
+              <a:t>9/21/2013</a:t>
             </a:fld>
             <a:endParaRPr lang="en-US" dirty="0"/>
           </a:p>
@@ -3416,7 +3443,7 @@
             <a:fld id="{B61BEF0D-F0BB-DE4B-95CE-6DB70DBA9567}" type="datetimeFigureOut">
               <a:rPr lang="en-US" smtClean="0"/>
               <a:pPr/>
-              <a:t>9/20/2013</a:t>
+              <a:t>9/21/2013</a:t>
             </a:fld>
             <a:endParaRPr lang="en-US" dirty="0"/>
           </a:p>
@@ -3710,7 +3737,7 @@
             <a:fld id="{B61BEF0D-F0BB-DE4B-95CE-6DB70DBA9567}" type="datetimeFigureOut">
               <a:rPr lang="en-US" smtClean="0"/>
               <a:pPr/>
-              <a:t>9/20/2013</a:t>
+              <a:t>9/21/2013</a:t>
             </a:fld>
             <a:endParaRPr lang="en-US" dirty="0"/>
           </a:p>
@@ -4142,7 +4169,7 @@
             <a:fld id="{B61BEF0D-F0BB-DE4B-95CE-6DB70DBA9567}" type="datetimeFigureOut">
               <a:rPr lang="en-US" smtClean="0"/>
               <a:pPr/>
-              <a:t>9/20/2013</a:t>
+              <a:t>9/21/2013</a:t>
             </a:fld>
             <a:endParaRPr lang="en-US" dirty="0"/>
           </a:p>
@@ -4268,7 +4295,7 @@
             <a:fld id="{B61BEF0D-F0BB-DE4B-95CE-6DB70DBA9567}" type="datetimeFigureOut">
               <a:rPr lang="en-US" smtClean="0"/>
               <a:pPr/>
-              <a:t>9/20/2013</a:t>
+              <a:t>9/21/2013</a:t>
             </a:fld>
             <a:endParaRPr lang="en-US" dirty="0"/>
           </a:p>
@@ -4365,7 +4392,7 @@
             <a:fld id="{B61BEF0D-F0BB-DE4B-95CE-6DB70DBA9567}" type="datetimeFigureOut">
               <a:rPr lang="en-US" smtClean="0"/>
               <a:pPr/>
-              <a:t>9/20/2013</a:t>
+              <a:t>9/21/2013</a:t>
             </a:fld>
             <a:endParaRPr lang="en-US" dirty="0"/>
           </a:p>
@@ -4650,7 +4677,7 @@
             <a:fld id="{B61BEF0D-F0BB-DE4B-95CE-6DB70DBA9567}" type="datetimeFigureOut">
               <a:rPr lang="en-US" smtClean="0"/>
               <a:pPr/>
-              <a:t>9/20/2013</a:t>
+              <a:t>9/21/2013</a:t>
             </a:fld>
             <a:endParaRPr lang="en-US" dirty="0"/>
           </a:p>
@@ -4943,7 +4970,7 @@
             <a:fld id="{B61BEF0D-F0BB-DE4B-95CE-6DB70DBA9567}" type="datetimeFigureOut">
               <a:rPr lang="en-US" smtClean="0"/>
               <a:pPr/>
-              <a:t>9/20/2013</a:t>
+              <a:t>9/21/2013</a:t>
             </a:fld>
             <a:endParaRPr lang="en-US" dirty="0"/>
           </a:p>
@@ -5176,7 +5203,7 @@
             <a:fld id="{B61BEF0D-F0BB-DE4B-95CE-6DB70DBA9567}" type="datetimeFigureOut">
               <a:rPr lang="en-US" smtClean="0"/>
               <a:pPr/>
-              <a:t>9/20/2013</a:t>
+              <a:t>9/21/2013</a:t>
             </a:fld>
             <a:endParaRPr lang="en-US" dirty="0"/>
           </a:p>
@@ -6814,6 +6841,2248 @@
 </p:sld>
 </file>
 
+<file path=ppt/slides/slide11.xml><?xml version="1.0" encoding="utf-8"?>
+<p:sld xmlns:a="http://schemas.openxmlformats.org/drawingml/2006/main" xmlns:r="http://schemas.openxmlformats.org/officeDocument/2006/relationships" xmlns:p="http://schemas.openxmlformats.org/presentationml/2006/main">
+  <p:cSld>
+    <p:spTree>
+      <p:nvGrpSpPr>
+        <p:cNvPr id="1" name=""/>
+        <p:cNvGrpSpPr/>
+        <p:nvPr/>
+      </p:nvGrpSpPr>
+      <p:grpSpPr>
+        <a:xfrm>
+          <a:off x="0" y="0"/>
+          <a:ext cx="0" cy="0"/>
+          <a:chOff x="0" y="0"/>
+          <a:chExt cx="0" cy="0"/>
+        </a:xfrm>
+      </p:grpSpPr>
+      <p:sp>
+        <p:nvSpPr>
+          <p:cNvPr id="2" name="Title 1"/>
+          <p:cNvSpPr>
+            <a:spLocks noGrp="1"/>
+          </p:cNvSpPr>
+          <p:nvPr>
+            <p:ph type="title"/>
+          </p:nvPr>
+        </p:nvSpPr>
+        <p:spPr/>
+        <p:txBody>
+          <a:bodyPr/>
+          <a:lstStyle/>
+          <a:p>
+            <a:r>
+              <a:rPr lang="en-US" dirty="0" smtClean="0"/>
+              <a:t>Select </a:t>
+            </a:r>
+            <a:r>
+              <a:rPr lang="en-US" dirty="0" err="1" smtClean="0"/>
+              <a:t>subquery</a:t>
+            </a:r>
+            <a:endParaRPr lang="en-US" dirty="0"/>
+          </a:p>
+        </p:txBody>
+      </p:sp>
+      <p:sp>
+        <p:nvSpPr>
+          <p:cNvPr id="4" name="Content Placeholder 2"/>
+          <p:cNvSpPr txBox="1">
+            <a:spLocks/>
+          </p:cNvSpPr>
+          <p:nvPr/>
+        </p:nvSpPr>
+        <p:spPr>
+          <a:xfrm>
+            <a:off x="818348" y="1540701"/>
+            <a:ext cx="7511472" cy="5317299"/>
+          </a:xfrm>
+          <a:prstGeom prst="rect">
+            <a:avLst/>
+          </a:prstGeom>
+        </p:spPr>
+        <p:txBody>
+          <a:bodyPr vert="horz" lIns="91440" tIns="45720" rIns="91440" bIns="45720" rtlCol="0" anchor="ctr">
+            <a:normAutofit fontScale="70000" lnSpcReduction="20000"/>
+          </a:bodyPr>
+          <a:lstStyle>
+            <a:lvl1pPr marL="285750" indent="-285750" algn="l" defTabSz="457200" rtl="0" eaLnBrk="1" latinLnBrk="0" hangingPunct="1">
+              <a:spcBef>
+                <a:spcPct val="20000"/>
+              </a:spcBef>
+              <a:spcAft>
+                <a:spcPts val="600"/>
+              </a:spcAft>
+              <a:buClr>
+                <a:schemeClr val="tx1"/>
+              </a:buClr>
+              <a:buSzPct val="130000"/>
+              <a:buFont typeface="Arial"/>
+              <a:buChar char="•"/>
+              <a:defRPr sz="1800" kern="1200" cap="small">
+                <a:gradFill flip="none" rotWithShape="1">
+                  <a:gsLst>
+                    <a:gs pos="0">
+                      <a:schemeClr val="tx1"/>
+                    </a:gs>
+                    <a:gs pos="100000">
+                      <a:schemeClr val="tx1">
+                        <a:lumMod val="75000"/>
+                      </a:schemeClr>
+                    </a:gs>
+                  </a:gsLst>
+                  <a:lin ang="5400000" scaled="0"/>
+                  <a:tileRect/>
+                </a:gradFill>
+                <a:effectLst>
+                  <a:glow rad="38100">
+                    <a:schemeClr val="bg1">
+                      <a:lumMod val="50000"/>
+                      <a:lumOff val="50000"/>
+                      <a:alpha val="20000"/>
+                    </a:schemeClr>
+                  </a:glow>
+                  <a:outerShdw blurRad="44450" dist="12700" dir="13860000" algn="tl" rotWithShape="0">
+                    <a:srgbClr val="000000">
+                      <a:alpha val="20000"/>
+                    </a:srgbClr>
+                  </a:outerShdw>
+                </a:effectLst>
+                <a:latin typeface="+mn-lt"/>
+                <a:ea typeface="+mn-ea"/>
+                <a:cs typeface="+mn-cs"/>
+              </a:defRPr>
+            </a:lvl1pPr>
+            <a:lvl2pPr marL="742950" indent="-285750" algn="l" defTabSz="457200" rtl="0" eaLnBrk="1" latinLnBrk="0" hangingPunct="1">
+              <a:spcBef>
+                <a:spcPct val="20000"/>
+              </a:spcBef>
+              <a:spcAft>
+                <a:spcPts val="600"/>
+              </a:spcAft>
+              <a:buClr>
+                <a:schemeClr val="tx1"/>
+              </a:buClr>
+              <a:buSzPct val="130000"/>
+              <a:buFont typeface="Arial"/>
+              <a:buChar char="•"/>
+              <a:defRPr sz="1600" kern="1200" cap="small">
+                <a:gradFill flip="none" rotWithShape="1">
+                  <a:gsLst>
+                    <a:gs pos="0">
+                      <a:schemeClr val="tx1"/>
+                    </a:gs>
+                    <a:gs pos="100000">
+                      <a:schemeClr val="tx1">
+                        <a:lumMod val="75000"/>
+                      </a:schemeClr>
+                    </a:gs>
+                  </a:gsLst>
+                  <a:lin ang="5400000" scaled="0"/>
+                  <a:tileRect/>
+                </a:gradFill>
+                <a:effectLst>
+                  <a:glow rad="38100">
+                    <a:schemeClr val="bg1">
+                      <a:lumMod val="50000"/>
+                      <a:lumOff val="50000"/>
+                      <a:alpha val="20000"/>
+                    </a:schemeClr>
+                  </a:glow>
+                  <a:outerShdw blurRad="44450" dist="12700" dir="13860000" algn="tl" rotWithShape="0">
+                    <a:srgbClr val="000000">
+                      <a:alpha val="20000"/>
+                    </a:srgbClr>
+                  </a:outerShdw>
+                </a:effectLst>
+                <a:latin typeface="+mn-lt"/>
+                <a:ea typeface="+mn-ea"/>
+                <a:cs typeface="+mn-cs"/>
+              </a:defRPr>
+            </a:lvl2pPr>
+            <a:lvl3pPr marL="1200150" indent="-285750" algn="l" defTabSz="457200" rtl="0" eaLnBrk="1" latinLnBrk="0" hangingPunct="1">
+              <a:spcBef>
+                <a:spcPct val="20000"/>
+              </a:spcBef>
+              <a:spcAft>
+                <a:spcPts val="600"/>
+              </a:spcAft>
+              <a:buClr>
+                <a:schemeClr val="tx1"/>
+              </a:buClr>
+              <a:buSzPct val="130000"/>
+              <a:buFont typeface="Arial"/>
+              <a:buChar char="•"/>
+              <a:defRPr sz="1400" kern="1200" cap="small">
+                <a:gradFill flip="none" rotWithShape="1">
+                  <a:gsLst>
+                    <a:gs pos="0">
+                      <a:schemeClr val="tx1"/>
+                    </a:gs>
+                    <a:gs pos="100000">
+                      <a:schemeClr val="tx1">
+                        <a:lumMod val="75000"/>
+                      </a:schemeClr>
+                    </a:gs>
+                  </a:gsLst>
+                  <a:lin ang="5400000" scaled="0"/>
+                  <a:tileRect/>
+                </a:gradFill>
+                <a:effectLst>
+                  <a:glow rad="38100">
+                    <a:schemeClr val="bg1">
+                      <a:lumMod val="50000"/>
+                      <a:lumOff val="50000"/>
+                      <a:alpha val="20000"/>
+                    </a:schemeClr>
+                  </a:glow>
+                  <a:outerShdw blurRad="44450" dist="12700" dir="13860000" algn="tl" rotWithShape="0">
+                    <a:srgbClr val="000000">
+                      <a:alpha val="20000"/>
+                    </a:srgbClr>
+                  </a:outerShdw>
+                </a:effectLst>
+                <a:latin typeface="+mn-lt"/>
+                <a:ea typeface="+mn-ea"/>
+                <a:cs typeface="+mn-cs"/>
+              </a:defRPr>
+            </a:lvl3pPr>
+            <a:lvl4pPr marL="1543050" indent="-171450" algn="l" defTabSz="457200" rtl="0" eaLnBrk="1" latinLnBrk="0" hangingPunct="1">
+              <a:spcBef>
+                <a:spcPct val="20000"/>
+              </a:spcBef>
+              <a:spcAft>
+                <a:spcPts val="600"/>
+              </a:spcAft>
+              <a:buClr>
+                <a:schemeClr val="tx1"/>
+              </a:buClr>
+              <a:buSzPct val="130000"/>
+              <a:buFont typeface="Arial"/>
+              <a:buChar char="•"/>
+              <a:defRPr sz="1400" kern="1200" cap="small">
+                <a:gradFill flip="none" rotWithShape="1">
+                  <a:gsLst>
+                    <a:gs pos="0">
+                      <a:schemeClr val="tx1"/>
+                    </a:gs>
+                    <a:gs pos="100000">
+                      <a:schemeClr val="tx1">
+                        <a:lumMod val="75000"/>
+                      </a:schemeClr>
+                    </a:gs>
+                  </a:gsLst>
+                  <a:lin ang="5400000" scaled="0"/>
+                  <a:tileRect/>
+                </a:gradFill>
+                <a:effectLst>
+                  <a:glow rad="38100">
+                    <a:schemeClr val="bg1">
+                      <a:lumMod val="50000"/>
+                      <a:lumOff val="50000"/>
+                      <a:alpha val="20000"/>
+                    </a:schemeClr>
+                  </a:glow>
+                  <a:outerShdw blurRad="44450" dist="12700" dir="13860000" algn="tl" rotWithShape="0">
+                    <a:srgbClr val="000000">
+                      <a:alpha val="20000"/>
+                    </a:srgbClr>
+                  </a:outerShdw>
+                </a:effectLst>
+                <a:latin typeface="+mn-lt"/>
+                <a:ea typeface="+mn-ea"/>
+                <a:cs typeface="+mn-cs"/>
+              </a:defRPr>
+            </a:lvl4pPr>
+            <a:lvl5pPr marL="2000250" indent="-171450" algn="l" defTabSz="457200" rtl="0" eaLnBrk="1" latinLnBrk="0" hangingPunct="1">
+              <a:spcBef>
+                <a:spcPct val="20000"/>
+              </a:spcBef>
+              <a:spcAft>
+                <a:spcPts val="600"/>
+              </a:spcAft>
+              <a:buClr>
+                <a:schemeClr val="tx1"/>
+              </a:buClr>
+              <a:buSzPct val="130000"/>
+              <a:buFont typeface="Arial"/>
+              <a:buChar char="•"/>
+              <a:defRPr sz="1200" kern="1200" cap="small">
+                <a:gradFill flip="none" rotWithShape="1">
+                  <a:gsLst>
+                    <a:gs pos="0">
+                      <a:schemeClr val="tx1"/>
+                    </a:gs>
+                    <a:gs pos="100000">
+                      <a:schemeClr val="tx1">
+                        <a:lumMod val="75000"/>
+                      </a:schemeClr>
+                    </a:gs>
+                  </a:gsLst>
+                  <a:lin ang="5400000" scaled="0"/>
+                  <a:tileRect/>
+                </a:gradFill>
+                <a:effectLst>
+                  <a:glow rad="38100">
+                    <a:schemeClr val="bg1">
+                      <a:lumMod val="50000"/>
+                      <a:lumOff val="50000"/>
+                      <a:alpha val="20000"/>
+                    </a:schemeClr>
+                  </a:glow>
+                  <a:outerShdw blurRad="44450" dist="12700" dir="13860000" algn="tl" rotWithShape="0">
+                    <a:srgbClr val="000000">
+                      <a:alpha val="20000"/>
+                    </a:srgbClr>
+                  </a:outerShdw>
+                </a:effectLst>
+                <a:latin typeface="+mn-lt"/>
+                <a:ea typeface="+mn-ea"/>
+                <a:cs typeface="+mn-cs"/>
+              </a:defRPr>
+            </a:lvl5pPr>
+            <a:lvl6pPr marL="2514600" indent="-228600" algn="l" defTabSz="457200" rtl="0" eaLnBrk="1" latinLnBrk="0" hangingPunct="1">
+              <a:spcBef>
+                <a:spcPct val="20000"/>
+              </a:spcBef>
+              <a:spcAft>
+                <a:spcPts val="600"/>
+              </a:spcAft>
+              <a:buClr>
+                <a:schemeClr val="tx1"/>
+              </a:buClr>
+              <a:buSzPct val="130000"/>
+              <a:buFont typeface="Arial"/>
+              <a:buChar char="•"/>
+              <a:defRPr sz="1100" kern="1200" cap="small">
+                <a:gradFill flip="none" rotWithShape="1">
+                  <a:gsLst>
+                    <a:gs pos="0">
+                      <a:schemeClr val="tx1"/>
+                    </a:gs>
+                    <a:gs pos="100000">
+                      <a:schemeClr val="tx1">
+                        <a:lumMod val="75000"/>
+                      </a:schemeClr>
+                    </a:gs>
+                  </a:gsLst>
+                  <a:lin ang="5400000" scaled="0"/>
+                  <a:tileRect/>
+                </a:gradFill>
+                <a:effectLst>
+                  <a:glow rad="38100">
+                    <a:schemeClr val="bg1">
+                      <a:lumMod val="50000"/>
+                      <a:lumOff val="50000"/>
+                      <a:alpha val="20000"/>
+                    </a:schemeClr>
+                  </a:glow>
+                  <a:outerShdw blurRad="44450" dist="12700" dir="13860000" algn="tl" rotWithShape="0">
+                    <a:srgbClr val="000000">
+                      <a:alpha val="20000"/>
+                    </a:srgbClr>
+                  </a:outerShdw>
+                </a:effectLst>
+                <a:latin typeface="+mn-lt"/>
+                <a:ea typeface="+mn-ea"/>
+                <a:cs typeface="+mn-cs"/>
+              </a:defRPr>
+            </a:lvl6pPr>
+            <a:lvl7pPr marL="2971800" indent="-228600" algn="l" defTabSz="457200" rtl="0" eaLnBrk="1" latinLnBrk="0" hangingPunct="1">
+              <a:spcBef>
+                <a:spcPct val="20000"/>
+              </a:spcBef>
+              <a:spcAft>
+                <a:spcPts val="600"/>
+              </a:spcAft>
+              <a:buClr>
+                <a:schemeClr val="tx1"/>
+              </a:buClr>
+              <a:buSzPct val="130000"/>
+              <a:buFont typeface="Arial"/>
+              <a:buChar char="•"/>
+              <a:defRPr sz="1100" kern="1200" cap="small">
+                <a:gradFill flip="none" rotWithShape="1">
+                  <a:gsLst>
+                    <a:gs pos="0">
+                      <a:schemeClr val="tx1"/>
+                    </a:gs>
+                    <a:gs pos="100000">
+                      <a:schemeClr val="tx1">
+                        <a:lumMod val="75000"/>
+                      </a:schemeClr>
+                    </a:gs>
+                  </a:gsLst>
+                  <a:lin ang="5400000" scaled="0"/>
+                  <a:tileRect/>
+                </a:gradFill>
+                <a:effectLst>
+                  <a:glow rad="38100">
+                    <a:schemeClr val="bg1">
+                      <a:lumMod val="50000"/>
+                      <a:lumOff val="50000"/>
+                      <a:alpha val="20000"/>
+                    </a:schemeClr>
+                  </a:glow>
+                  <a:outerShdw blurRad="44450" dist="12700" dir="13860000" algn="tl" rotWithShape="0">
+                    <a:srgbClr val="000000">
+                      <a:alpha val="20000"/>
+                    </a:srgbClr>
+                  </a:outerShdw>
+                </a:effectLst>
+                <a:latin typeface="+mn-lt"/>
+                <a:ea typeface="+mn-ea"/>
+                <a:cs typeface="+mn-cs"/>
+              </a:defRPr>
+            </a:lvl7pPr>
+            <a:lvl8pPr marL="3429000" indent="-228600" algn="l" defTabSz="457200" rtl="0" eaLnBrk="1" latinLnBrk="0" hangingPunct="1">
+              <a:spcBef>
+                <a:spcPct val="20000"/>
+              </a:spcBef>
+              <a:spcAft>
+                <a:spcPts val="600"/>
+              </a:spcAft>
+              <a:buClr>
+                <a:schemeClr val="tx1"/>
+              </a:buClr>
+              <a:buSzPct val="130000"/>
+              <a:buFont typeface="Arial"/>
+              <a:buChar char="•"/>
+              <a:defRPr sz="1100" kern="1200" cap="small">
+                <a:gradFill flip="none" rotWithShape="1">
+                  <a:gsLst>
+                    <a:gs pos="0">
+                      <a:schemeClr val="tx1"/>
+                    </a:gs>
+                    <a:gs pos="100000">
+                      <a:schemeClr val="tx1">
+                        <a:lumMod val="75000"/>
+                      </a:schemeClr>
+                    </a:gs>
+                  </a:gsLst>
+                  <a:lin ang="5400000" scaled="0"/>
+                  <a:tileRect/>
+                </a:gradFill>
+                <a:effectLst>
+                  <a:glow rad="38100">
+                    <a:schemeClr val="bg1">
+                      <a:lumMod val="50000"/>
+                      <a:lumOff val="50000"/>
+                      <a:alpha val="20000"/>
+                    </a:schemeClr>
+                  </a:glow>
+                  <a:outerShdw blurRad="44450" dist="12700" dir="13860000" algn="tl" rotWithShape="0">
+                    <a:srgbClr val="000000">
+                      <a:alpha val="20000"/>
+                    </a:srgbClr>
+                  </a:outerShdw>
+                </a:effectLst>
+                <a:latin typeface="+mn-lt"/>
+                <a:ea typeface="+mn-ea"/>
+                <a:cs typeface="+mn-cs"/>
+              </a:defRPr>
+            </a:lvl8pPr>
+            <a:lvl9pPr marL="3886200" indent="-228600" algn="l" defTabSz="457200" rtl="0" eaLnBrk="1" latinLnBrk="0" hangingPunct="1">
+              <a:spcBef>
+                <a:spcPct val="20000"/>
+              </a:spcBef>
+              <a:spcAft>
+                <a:spcPts val="600"/>
+              </a:spcAft>
+              <a:buClr>
+                <a:schemeClr val="tx1"/>
+              </a:buClr>
+              <a:buSzPct val="100000"/>
+              <a:buFont typeface="Arial"/>
+              <a:buChar char="•"/>
+              <a:defRPr sz="1100" kern="1200" cap="small">
+                <a:gradFill flip="none" rotWithShape="1">
+                  <a:gsLst>
+                    <a:gs pos="0">
+                      <a:schemeClr val="tx1"/>
+                    </a:gs>
+                    <a:gs pos="100000">
+                      <a:schemeClr val="tx1">
+                        <a:lumMod val="75000"/>
+                      </a:schemeClr>
+                    </a:gs>
+                  </a:gsLst>
+                  <a:lin ang="5400000" scaled="0"/>
+                  <a:tileRect/>
+                </a:gradFill>
+                <a:effectLst>
+                  <a:glow rad="38100">
+                    <a:schemeClr val="bg1">
+                      <a:lumMod val="50000"/>
+                      <a:lumOff val="50000"/>
+                      <a:alpha val="20000"/>
+                    </a:schemeClr>
+                  </a:glow>
+                  <a:outerShdw blurRad="44450" dist="12700" dir="13860000" algn="tl" rotWithShape="0">
+                    <a:srgbClr val="000000">
+                      <a:alpha val="20000"/>
+                    </a:srgbClr>
+                  </a:outerShdw>
+                </a:effectLst>
+                <a:latin typeface="+mn-lt"/>
+                <a:ea typeface="+mn-ea"/>
+                <a:cs typeface="+mn-cs"/>
+              </a:defRPr>
+            </a:lvl9pPr>
+          </a:lstStyle>
+          <a:p>
+            <a:pPr marL="0" indent="0">
+              <a:buFont typeface="Arial"/>
+              <a:buNone/>
+            </a:pPr>
+            <a:r>
+              <a:rPr lang="en-US" dirty="0" smtClean="0"/>
+              <a:t> </a:t>
+            </a:r>
+            <a:r>
+              <a:rPr lang="en-US" dirty="0" err="1" smtClean="0"/>
+              <a:t>sid</a:t>
+            </a:r>
+            <a:r>
+              <a:rPr lang="en-US" dirty="0" smtClean="0"/>
+              <a:t> |      </a:t>
+            </a:r>
+            <a:r>
+              <a:rPr lang="en-US" dirty="0" err="1" smtClean="0"/>
+              <a:t>sname</a:t>
+            </a:r>
+            <a:endParaRPr lang="en-US" dirty="0" smtClean="0"/>
+          </a:p>
+          <a:p>
+            <a:pPr marL="0" indent="0">
+              <a:buFont typeface="Arial"/>
+              <a:buNone/>
+            </a:pPr>
+            <a:r>
+              <a:rPr lang="en-US" dirty="0" smtClean="0"/>
+              <a:t>-----+-----------------</a:t>
+            </a:r>
+          </a:p>
+          <a:p>
+            <a:pPr marL="0" indent="0">
+              <a:buFont typeface="Arial"/>
+              <a:buNone/>
+            </a:pPr>
+            <a:r>
+              <a:rPr lang="en-US" dirty="0" smtClean="0"/>
+              <a:t>   1 | </a:t>
+            </a:r>
+            <a:r>
+              <a:rPr lang="en-US" dirty="0" err="1" smtClean="0"/>
+              <a:t>Tschingis</a:t>
+            </a:r>
+            <a:r>
+              <a:rPr lang="en-US" dirty="0" smtClean="0"/>
+              <a:t> Khan</a:t>
+            </a:r>
+          </a:p>
+          <a:p>
+            <a:pPr marL="0" indent="0">
+              <a:buFont typeface="Arial"/>
+              <a:buNone/>
+            </a:pPr>
+            <a:r>
+              <a:rPr lang="en-US" dirty="0" smtClean="0"/>
+              <a:t>   2 | </a:t>
+            </a:r>
+            <a:r>
+              <a:rPr lang="en-US" dirty="0" err="1" smtClean="0"/>
+              <a:t>Petr</a:t>
+            </a:r>
+            <a:r>
+              <a:rPr lang="en-US" dirty="0" smtClean="0"/>
+              <a:t> I</a:t>
+            </a:r>
+          </a:p>
+          <a:p>
+            <a:pPr marL="0" indent="0">
+              <a:buFont typeface="Arial"/>
+              <a:buNone/>
+            </a:pPr>
+            <a:r>
+              <a:rPr lang="en-US" dirty="0" smtClean="0"/>
+              <a:t>   2 | </a:t>
+            </a:r>
+            <a:r>
+              <a:rPr lang="en-US" dirty="0" err="1" smtClean="0"/>
+              <a:t>Petr</a:t>
+            </a:r>
+            <a:r>
+              <a:rPr lang="en-US" dirty="0" smtClean="0"/>
+              <a:t> I</a:t>
+            </a:r>
+          </a:p>
+          <a:p>
+            <a:pPr marL="0" indent="0">
+              <a:buFont typeface="Arial"/>
+              <a:buNone/>
+            </a:pPr>
+            <a:r>
+              <a:rPr lang="en-US" dirty="0" smtClean="0"/>
+              <a:t>   5 | Elena </a:t>
+            </a:r>
+            <a:r>
+              <a:rPr lang="en-US" dirty="0" err="1" smtClean="0"/>
+              <a:t>Vaenga</a:t>
+            </a:r>
+            <a:endParaRPr lang="en-US" dirty="0" smtClean="0"/>
+          </a:p>
+          <a:p>
+            <a:pPr marL="0" indent="0">
+              <a:buFont typeface="Arial"/>
+              <a:buNone/>
+            </a:pPr>
+            <a:r>
+              <a:rPr lang="en-US" dirty="0" smtClean="0"/>
+              <a:t>   6 | </a:t>
+            </a:r>
+            <a:r>
+              <a:rPr lang="en-US" dirty="0" err="1" smtClean="0"/>
+              <a:t>Dima</a:t>
+            </a:r>
+            <a:r>
+              <a:rPr lang="en-US" dirty="0" smtClean="0"/>
+              <a:t> </a:t>
+            </a:r>
+            <a:r>
+              <a:rPr lang="en-US" dirty="0" err="1" smtClean="0"/>
+              <a:t>Bilan</a:t>
+            </a:r>
+            <a:endParaRPr lang="en-US" dirty="0" smtClean="0"/>
+          </a:p>
+          <a:p>
+            <a:pPr marL="0" indent="0">
+              <a:buFont typeface="Arial"/>
+              <a:buNone/>
+            </a:pPr>
+            <a:r>
+              <a:rPr lang="en-US" dirty="0" smtClean="0"/>
+              <a:t>   6 | </a:t>
+            </a:r>
+            <a:r>
+              <a:rPr lang="en-US" dirty="0" err="1" smtClean="0"/>
+              <a:t>Dima</a:t>
+            </a:r>
+            <a:r>
+              <a:rPr lang="en-US" dirty="0" smtClean="0"/>
+              <a:t> </a:t>
+            </a:r>
+            <a:r>
+              <a:rPr lang="en-US" dirty="0" err="1" smtClean="0"/>
+              <a:t>Bilan</a:t>
+            </a:r>
+            <a:endParaRPr lang="en-US" dirty="0" smtClean="0"/>
+          </a:p>
+          <a:p>
+            <a:pPr marL="0" indent="0">
+              <a:buFont typeface="Arial"/>
+              <a:buNone/>
+            </a:pPr>
+            <a:r>
+              <a:rPr lang="en-US" dirty="0" smtClean="0"/>
+              <a:t>  18 | Al-</a:t>
+            </a:r>
+            <a:r>
+              <a:rPr lang="en-US" dirty="0" err="1" smtClean="0"/>
+              <a:t>Horezmi</a:t>
+            </a:r>
+            <a:endParaRPr lang="en-US" dirty="0" smtClean="0"/>
+          </a:p>
+          <a:p>
+            <a:pPr marL="0" indent="0">
+              <a:buFont typeface="Arial"/>
+              <a:buNone/>
+            </a:pPr>
+            <a:r>
+              <a:rPr lang="en-US" dirty="0" smtClean="0"/>
+              <a:t>  18 | Al-</a:t>
+            </a:r>
+            <a:r>
+              <a:rPr lang="en-US" dirty="0" err="1" smtClean="0"/>
+              <a:t>Horezmi</a:t>
+            </a:r>
+            <a:endParaRPr lang="en-US" dirty="0" smtClean="0"/>
+          </a:p>
+          <a:p>
+            <a:pPr marL="0" indent="0">
+              <a:buFont typeface="Arial"/>
+              <a:buNone/>
+            </a:pPr>
+            <a:r>
+              <a:rPr lang="en-US" dirty="0" smtClean="0"/>
+              <a:t>  19 | Vladimir Lenin</a:t>
+            </a:r>
+          </a:p>
+          <a:p>
+            <a:pPr marL="0" indent="0">
+              <a:buFont typeface="Arial"/>
+              <a:buNone/>
+            </a:pPr>
+            <a:r>
+              <a:rPr lang="en-US" dirty="0" smtClean="0"/>
+              <a:t>  19 | Vladimir Lenin</a:t>
+            </a:r>
+          </a:p>
+          <a:p>
+            <a:pPr marL="0" indent="0">
+              <a:buFont typeface="Arial"/>
+              <a:buNone/>
+            </a:pPr>
+            <a:r>
+              <a:rPr lang="en-US" dirty="0" smtClean="0"/>
+              <a:t>  19 | Vladimir Lenin</a:t>
+            </a:r>
+          </a:p>
+          <a:p>
+            <a:pPr marL="0" indent="0">
+              <a:buFont typeface="Arial"/>
+              <a:buNone/>
+            </a:pPr>
+            <a:r>
+              <a:rPr lang="en-US" dirty="0" smtClean="0"/>
+              <a:t>  20 | Nikola Tesla</a:t>
+            </a:r>
+          </a:p>
+          <a:p>
+            <a:pPr marL="0" indent="0">
+              <a:buFont typeface="Arial"/>
+              <a:buNone/>
+            </a:pPr>
+            <a:r>
+              <a:rPr lang="en-US" dirty="0" smtClean="0"/>
+              <a:t>  21 | Albert Einstein</a:t>
+            </a:r>
+          </a:p>
+          <a:p>
+            <a:pPr marL="0" indent="0">
+              <a:buFont typeface="Arial"/>
+              <a:buNone/>
+            </a:pPr>
+            <a:r>
+              <a:rPr lang="en-US" dirty="0" smtClean="0"/>
+              <a:t>  21 | Albert Einstein</a:t>
+            </a:r>
+          </a:p>
+          <a:p>
+            <a:pPr marL="0" indent="0">
+              <a:buFont typeface="Arial"/>
+              <a:buNone/>
+            </a:pPr>
+            <a:r>
+              <a:rPr lang="en-US" dirty="0" smtClean="0"/>
+              <a:t>  21 | Albert Einstein</a:t>
+            </a:r>
+          </a:p>
+          <a:p>
+            <a:pPr marL="0" indent="0">
+              <a:buFont typeface="Arial"/>
+              <a:buNone/>
+            </a:pPr>
+            <a:r>
+              <a:rPr lang="en-US" dirty="0" smtClean="0"/>
+              <a:t>  21 | Albert Einstein</a:t>
+            </a:r>
+          </a:p>
+          <a:p>
+            <a:pPr marL="0" indent="0">
+              <a:buFont typeface="Arial"/>
+              <a:buNone/>
+            </a:pPr>
+            <a:r>
+              <a:rPr lang="en-US" dirty="0" smtClean="0"/>
+              <a:t>  23 | </a:t>
+            </a:r>
+            <a:r>
+              <a:rPr lang="en-US" dirty="0" err="1" smtClean="0"/>
+              <a:t>Stas</a:t>
+            </a:r>
+            <a:r>
+              <a:rPr lang="en-US" dirty="0" smtClean="0"/>
+              <a:t> </a:t>
+            </a:r>
+            <a:r>
+              <a:rPr lang="en-US" dirty="0" err="1" smtClean="0"/>
+              <a:t>Mikhailov</a:t>
+            </a:r>
+            <a:endParaRPr lang="en-US" dirty="0"/>
+          </a:p>
+        </p:txBody>
+      </p:sp>
+      <p:sp>
+        <p:nvSpPr>
+          <p:cNvPr id="3" name="Right Arrow 2"/>
+          <p:cNvSpPr/>
+          <p:nvPr/>
+        </p:nvSpPr>
+        <p:spPr>
+          <a:xfrm rot="10800000">
+            <a:off x="2631232" y="4506686"/>
+            <a:ext cx="1782147" cy="503853"/>
+          </a:xfrm>
+          <a:prstGeom prst="rightArrow">
+            <a:avLst/>
+          </a:prstGeom>
+        </p:spPr>
+        <p:style>
+          <a:lnRef idx="2">
+            <a:schemeClr val="accent1">
+              <a:shade val="50000"/>
+            </a:schemeClr>
+          </a:lnRef>
+          <a:fillRef idx="1">
+            <a:schemeClr val="accent1"/>
+          </a:fillRef>
+          <a:effectRef idx="0">
+            <a:schemeClr val="accent1"/>
+          </a:effectRef>
+          <a:fontRef idx="minor">
+            <a:schemeClr val="lt1"/>
+          </a:fontRef>
+        </p:style>
+        <p:txBody>
+          <a:bodyPr rtlCol="0" anchor="ctr"/>
+          <a:lstStyle/>
+          <a:p>
+            <a:pPr algn="ctr"/>
+            <a:endParaRPr lang="en-US"/>
+          </a:p>
+        </p:txBody>
+      </p:sp>
+      <p:sp>
+        <p:nvSpPr>
+          <p:cNvPr id="5" name="TextBox 4"/>
+          <p:cNvSpPr txBox="1"/>
+          <p:nvPr/>
+        </p:nvSpPr>
+        <p:spPr>
+          <a:xfrm>
+            <a:off x="4917233" y="4627984"/>
+            <a:ext cx="3509294" cy="369332"/>
+          </a:xfrm>
+          <a:prstGeom prst="rect">
+            <a:avLst/>
+          </a:prstGeom>
+          <a:noFill/>
+        </p:spPr>
+        <p:txBody>
+          <a:bodyPr wrap="none" rtlCol="0">
+            <a:spAutoFit/>
+          </a:bodyPr>
+          <a:lstStyle/>
+          <a:p>
+            <a:r>
+              <a:rPr lang="ru-RU" dirty="0" smtClean="0"/>
+              <a:t>Как убрать повторяющиеся?</a:t>
+            </a:r>
+            <a:endParaRPr lang="en-US" dirty="0"/>
+          </a:p>
+        </p:txBody>
+      </p:sp>
+    </p:spTree>
+    <p:extLst>
+      <p:ext uri="{BB962C8B-B14F-4D97-AF65-F5344CB8AC3E}">
+        <p14:creationId xmlns:p14="http://schemas.microsoft.com/office/powerpoint/2010/main" val="2058793666"/>
+      </p:ext>
+    </p:extLst>
+  </p:cSld>
+  <p:clrMapOvr>
+    <a:masterClrMapping/>
+  </p:clrMapOvr>
+  <p:timing>
+    <p:tnLst>
+      <p:par>
+        <p:cTn id="1" dur="indefinite" restart="never" nodeType="tmRoot"/>
+      </p:par>
+    </p:tnLst>
+  </p:timing>
+</p:sld>
+</file>
+
+<file path=ppt/slides/slide12.xml><?xml version="1.0" encoding="utf-8"?>
+<p:sld xmlns:a="http://schemas.openxmlformats.org/drawingml/2006/main" xmlns:r="http://schemas.openxmlformats.org/officeDocument/2006/relationships" xmlns:p="http://schemas.openxmlformats.org/presentationml/2006/main">
+  <p:cSld>
+    <p:spTree>
+      <p:nvGrpSpPr>
+        <p:cNvPr id="1" name=""/>
+        <p:cNvGrpSpPr/>
+        <p:nvPr/>
+      </p:nvGrpSpPr>
+      <p:grpSpPr>
+        <a:xfrm>
+          <a:off x="0" y="0"/>
+          <a:ext cx="0" cy="0"/>
+          <a:chOff x="0" y="0"/>
+          <a:chExt cx="0" cy="0"/>
+        </a:xfrm>
+      </p:grpSpPr>
+      <p:sp>
+        <p:nvSpPr>
+          <p:cNvPr id="2" name="Title 1"/>
+          <p:cNvSpPr>
+            <a:spLocks noGrp="1"/>
+          </p:cNvSpPr>
+          <p:nvPr>
+            <p:ph type="title"/>
+          </p:nvPr>
+        </p:nvSpPr>
+        <p:spPr/>
+        <p:txBody>
+          <a:bodyPr/>
+          <a:lstStyle/>
+          <a:p>
+            <a:r>
+              <a:rPr lang="en-US" dirty="0" smtClean="0"/>
+              <a:t>Select </a:t>
+            </a:r>
+            <a:r>
+              <a:rPr lang="en-US" dirty="0" err="1" smtClean="0"/>
+              <a:t>subquery</a:t>
+            </a:r>
+            <a:r>
+              <a:rPr lang="en-US" dirty="0"/>
+              <a:t/>
+            </a:r>
+            <a:br>
+              <a:rPr lang="en-US" dirty="0"/>
+            </a:br>
+            <a:r>
+              <a:rPr lang="en-US" dirty="0" smtClean="0"/>
+              <a:t>Distinct</a:t>
+            </a:r>
+            <a:endParaRPr lang="en-US" dirty="0"/>
+          </a:p>
+        </p:txBody>
+      </p:sp>
+      <p:sp>
+        <p:nvSpPr>
+          <p:cNvPr id="3" name="Content Placeholder 2"/>
+          <p:cNvSpPr>
+            <a:spLocks noGrp="1"/>
+          </p:cNvSpPr>
+          <p:nvPr>
+            <p:ph idx="1"/>
+          </p:nvPr>
+        </p:nvSpPr>
+        <p:spPr/>
+        <p:txBody>
+          <a:bodyPr/>
+          <a:lstStyle/>
+          <a:p>
+            <a:pPr marL="0" indent="0">
+              <a:buNone/>
+            </a:pPr>
+            <a:r>
+              <a:rPr lang="en-US" dirty="0" smtClean="0"/>
+              <a:t>		</a:t>
+            </a:r>
+            <a:r>
+              <a:rPr lang="en-US" dirty="0" smtClean="0"/>
+              <a:t>select </a:t>
+            </a:r>
+            <a:r>
+              <a:rPr lang="en-US" dirty="0" smtClean="0">
+                <a:solidFill>
+                  <a:srgbClr val="FF0000"/>
+                </a:solidFill>
+              </a:rPr>
+              <a:t>distinct </a:t>
+            </a:r>
+            <a:r>
+              <a:rPr lang="en-US" dirty="0" err="1" smtClean="0"/>
+              <a:t>Student.sID</a:t>
+            </a:r>
+            <a:r>
+              <a:rPr lang="en-US" dirty="0" smtClean="0"/>
+              <a:t>,</a:t>
+            </a:r>
+            <a:r>
+              <a:rPr lang="en-US" b="1" dirty="0" smtClean="0">
+                <a:solidFill>
+                  <a:srgbClr val="FF0000"/>
+                </a:solidFill>
+              </a:rPr>
+              <a:t> </a:t>
+            </a:r>
+            <a:r>
+              <a:rPr lang="en-US" dirty="0" err="1" smtClean="0"/>
+              <a:t>sName</a:t>
+            </a:r>
+            <a:endParaRPr lang="en-US" dirty="0" smtClean="0"/>
+          </a:p>
+          <a:p>
+            <a:pPr marL="0" indent="0">
+              <a:buNone/>
+            </a:pPr>
+            <a:r>
+              <a:rPr lang="en-US" dirty="0" smtClean="0"/>
+              <a:t>		from Student, Apply</a:t>
+            </a:r>
+          </a:p>
+          <a:p>
+            <a:pPr marL="0" indent="0">
+              <a:buNone/>
+            </a:pPr>
+            <a:r>
+              <a:rPr lang="en-US" dirty="0" smtClean="0"/>
+              <a:t>		where </a:t>
+            </a:r>
+            <a:r>
+              <a:rPr lang="en-US" dirty="0" err="1" smtClean="0"/>
+              <a:t>Student.sID</a:t>
+            </a:r>
+            <a:r>
+              <a:rPr lang="en-US" dirty="0" smtClean="0"/>
+              <a:t> = </a:t>
+            </a:r>
+            <a:r>
+              <a:rPr lang="en-US" dirty="0" err="1" smtClean="0"/>
+              <a:t>Apply.sID</a:t>
+            </a:r>
+            <a:r>
+              <a:rPr lang="en-US" dirty="0" smtClean="0"/>
+              <a:t> and major = ‘History’</a:t>
+            </a:r>
+            <a:endParaRPr lang="en-US" dirty="0"/>
+          </a:p>
+        </p:txBody>
+      </p:sp>
+    </p:spTree>
+    <p:extLst>
+      <p:ext uri="{BB962C8B-B14F-4D97-AF65-F5344CB8AC3E}">
+        <p14:creationId xmlns:p14="http://schemas.microsoft.com/office/powerpoint/2010/main" val="4031391539"/>
+      </p:ext>
+    </p:extLst>
+  </p:cSld>
+  <p:clrMapOvr>
+    <a:masterClrMapping/>
+  </p:clrMapOvr>
+  <p:timing>
+    <p:tnLst>
+      <p:par>
+        <p:cTn id="1" dur="indefinite" restart="never" nodeType="tmRoot"/>
+      </p:par>
+    </p:tnLst>
+  </p:timing>
+</p:sld>
+</file>
+
+<file path=ppt/slides/slide13.xml><?xml version="1.0" encoding="utf-8"?>
+<p:sld xmlns:a="http://schemas.openxmlformats.org/drawingml/2006/main" xmlns:r="http://schemas.openxmlformats.org/officeDocument/2006/relationships" xmlns:p="http://schemas.openxmlformats.org/presentationml/2006/main">
+  <p:cSld>
+    <p:spTree>
+      <p:nvGrpSpPr>
+        <p:cNvPr id="1" name=""/>
+        <p:cNvGrpSpPr/>
+        <p:nvPr/>
+      </p:nvGrpSpPr>
+      <p:grpSpPr>
+        <a:xfrm>
+          <a:off x="0" y="0"/>
+          <a:ext cx="0" cy="0"/>
+          <a:chOff x="0" y="0"/>
+          <a:chExt cx="0" cy="0"/>
+        </a:xfrm>
+      </p:grpSpPr>
+      <p:sp>
+        <p:nvSpPr>
+          <p:cNvPr id="2" name="Title 1"/>
+          <p:cNvSpPr>
+            <a:spLocks noGrp="1"/>
+          </p:cNvSpPr>
+          <p:nvPr>
+            <p:ph type="title"/>
+          </p:nvPr>
+        </p:nvSpPr>
+        <p:spPr/>
+        <p:txBody>
+          <a:bodyPr/>
+          <a:lstStyle/>
+          <a:p>
+            <a:r>
+              <a:rPr lang="en-US" dirty="0" smtClean="0"/>
+              <a:t>Select </a:t>
+            </a:r>
+            <a:r>
+              <a:rPr lang="en-US" dirty="0" err="1" smtClean="0"/>
+              <a:t>subquery</a:t>
+            </a:r>
+            <a:r>
+              <a:rPr lang="en-US" dirty="0"/>
+              <a:t/>
+            </a:r>
+            <a:br>
+              <a:rPr lang="en-US" dirty="0"/>
+            </a:br>
+            <a:r>
+              <a:rPr lang="en-US" dirty="0" smtClean="0"/>
+              <a:t>Distinct</a:t>
+            </a:r>
+            <a:endParaRPr lang="en-US" dirty="0"/>
+          </a:p>
+        </p:txBody>
+      </p:sp>
+      <p:sp>
+        <p:nvSpPr>
+          <p:cNvPr id="3" name="Content Placeholder 2"/>
+          <p:cNvSpPr>
+            <a:spLocks noGrp="1"/>
+          </p:cNvSpPr>
+          <p:nvPr>
+            <p:ph idx="1"/>
+          </p:nvPr>
+        </p:nvSpPr>
+        <p:spPr/>
+        <p:txBody>
+          <a:bodyPr/>
+          <a:lstStyle/>
+          <a:p>
+            <a:pPr marL="0" indent="0">
+              <a:buNone/>
+            </a:pPr>
+            <a:r>
+              <a:rPr lang="en-US" dirty="0" smtClean="0"/>
+              <a:t>		</a:t>
+            </a:r>
+            <a:r>
+              <a:rPr lang="en-US" dirty="0" smtClean="0"/>
+              <a:t>select distinct GPA</a:t>
+            </a:r>
+            <a:endParaRPr lang="en-US" dirty="0" smtClean="0"/>
+          </a:p>
+          <a:p>
+            <a:pPr marL="0" indent="0">
+              <a:buNone/>
+            </a:pPr>
+            <a:r>
+              <a:rPr lang="en-US" dirty="0" smtClean="0"/>
+              <a:t>		from Student, Apply</a:t>
+            </a:r>
+          </a:p>
+          <a:p>
+            <a:pPr marL="0" indent="0">
+              <a:buNone/>
+            </a:pPr>
+            <a:r>
+              <a:rPr lang="en-US" dirty="0" smtClean="0"/>
+              <a:t>		where </a:t>
+            </a:r>
+            <a:r>
+              <a:rPr lang="en-US" dirty="0" err="1" smtClean="0"/>
+              <a:t>Student.sID</a:t>
+            </a:r>
+            <a:r>
+              <a:rPr lang="en-US" dirty="0" smtClean="0"/>
+              <a:t> = </a:t>
+            </a:r>
+            <a:r>
+              <a:rPr lang="en-US" dirty="0" err="1" smtClean="0"/>
+              <a:t>Apply.sID</a:t>
+            </a:r>
+            <a:r>
+              <a:rPr lang="en-US" dirty="0" smtClean="0"/>
+              <a:t> and major = ‘History’</a:t>
+            </a:r>
+            <a:endParaRPr lang="en-US" dirty="0"/>
+          </a:p>
+        </p:txBody>
+      </p:sp>
+      <p:sp>
+        <p:nvSpPr>
+          <p:cNvPr id="4" name="Right Arrow 3"/>
+          <p:cNvSpPr/>
+          <p:nvPr/>
+        </p:nvSpPr>
+        <p:spPr>
+          <a:xfrm rot="9748904">
+            <a:off x="3788229" y="3032449"/>
+            <a:ext cx="2043404" cy="606490"/>
+          </a:xfrm>
+          <a:prstGeom prst="rightArrow">
+            <a:avLst/>
+          </a:prstGeom>
+        </p:spPr>
+        <p:style>
+          <a:lnRef idx="2">
+            <a:schemeClr val="accent1">
+              <a:shade val="50000"/>
+            </a:schemeClr>
+          </a:lnRef>
+          <a:fillRef idx="1">
+            <a:schemeClr val="accent1"/>
+          </a:fillRef>
+          <a:effectRef idx="0">
+            <a:schemeClr val="accent1"/>
+          </a:effectRef>
+          <a:fontRef idx="minor">
+            <a:schemeClr val="lt1"/>
+          </a:fontRef>
+        </p:style>
+        <p:txBody>
+          <a:bodyPr rtlCol="0" anchor="ctr"/>
+          <a:lstStyle/>
+          <a:p>
+            <a:pPr algn="ctr"/>
+            <a:endParaRPr lang="en-US"/>
+          </a:p>
+        </p:txBody>
+      </p:sp>
+      <p:sp>
+        <p:nvSpPr>
+          <p:cNvPr id="5" name="TextBox 4"/>
+          <p:cNvSpPr txBox="1"/>
+          <p:nvPr/>
+        </p:nvSpPr>
+        <p:spPr>
+          <a:xfrm>
+            <a:off x="5875528" y="2738970"/>
+            <a:ext cx="2977097" cy="923330"/>
+          </a:xfrm>
+          <a:prstGeom prst="rect">
+            <a:avLst/>
+          </a:prstGeom>
+          <a:noFill/>
+        </p:spPr>
+        <p:txBody>
+          <a:bodyPr wrap="none" rtlCol="0">
+            <a:spAutoFit/>
+          </a:bodyPr>
+          <a:lstStyle/>
+          <a:p>
+            <a:r>
+              <a:rPr lang="ru-RU" dirty="0" smtClean="0"/>
+              <a:t>Нужен ли </a:t>
+            </a:r>
+            <a:r>
+              <a:rPr lang="en-US" dirty="0" smtClean="0"/>
+              <a:t>DISTINCT, </a:t>
+            </a:r>
+            <a:r>
+              <a:rPr lang="ru-RU" dirty="0" smtClean="0"/>
+              <a:t>если</a:t>
+            </a:r>
+          </a:p>
+          <a:p>
+            <a:r>
+              <a:rPr lang="ru-RU" dirty="0" smtClean="0"/>
+              <a:t>мы хотим посчитать</a:t>
+            </a:r>
+          </a:p>
+          <a:p>
+            <a:r>
+              <a:rPr lang="ru-RU" dirty="0" smtClean="0"/>
+              <a:t>среднюю </a:t>
+            </a:r>
+            <a:r>
+              <a:rPr lang="en-US" dirty="0" smtClean="0"/>
+              <a:t>GPA</a:t>
+            </a:r>
+            <a:r>
+              <a:rPr lang="ru-RU" dirty="0" smtClean="0"/>
+              <a:t>?</a:t>
+            </a:r>
+            <a:endParaRPr lang="en-US" dirty="0"/>
+          </a:p>
+        </p:txBody>
+      </p:sp>
+    </p:spTree>
+    <p:extLst>
+      <p:ext uri="{BB962C8B-B14F-4D97-AF65-F5344CB8AC3E}">
+        <p14:creationId xmlns:p14="http://schemas.microsoft.com/office/powerpoint/2010/main" val="1490086507"/>
+      </p:ext>
+    </p:extLst>
+  </p:cSld>
+  <p:clrMapOvr>
+    <a:masterClrMapping/>
+  </p:clrMapOvr>
+  <p:timing>
+    <p:tnLst>
+      <p:par>
+        <p:cTn id="1" dur="indefinite" restart="never" nodeType="tmRoot"/>
+      </p:par>
+    </p:tnLst>
+  </p:timing>
+</p:sld>
+</file>
+
+<file path=ppt/slides/slide14.xml><?xml version="1.0" encoding="utf-8"?>
+<p:sld xmlns:a="http://schemas.openxmlformats.org/drawingml/2006/main" xmlns:r="http://schemas.openxmlformats.org/officeDocument/2006/relationships" xmlns:p="http://schemas.openxmlformats.org/presentationml/2006/main">
+  <p:cSld>
+    <p:spTree>
+      <p:nvGrpSpPr>
+        <p:cNvPr id="1" name=""/>
+        <p:cNvGrpSpPr/>
+        <p:nvPr/>
+      </p:nvGrpSpPr>
+      <p:grpSpPr>
+        <a:xfrm>
+          <a:off x="0" y="0"/>
+          <a:ext cx="0" cy="0"/>
+          <a:chOff x="0" y="0"/>
+          <a:chExt cx="0" cy="0"/>
+        </a:xfrm>
+      </p:grpSpPr>
+      <p:sp>
+        <p:nvSpPr>
+          <p:cNvPr id="2" name="Title 1"/>
+          <p:cNvSpPr>
+            <a:spLocks noGrp="1"/>
+          </p:cNvSpPr>
+          <p:nvPr>
+            <p:ph type="title"/>
+          </p:nvPr>
+        </p:nvSpPr>
+        <p:spPr/>
+        <p:txBody>
+          <a:bodyPr/>
+          <a:lstStyle/>
+          <a:p>
+            <a:r>
+              <a:rPr lang="en-US" dirty="0" smtClean="0"/>
+              <a:t>Select </a:t>
+            </a:r>
+            <a:r>
+              <a:rPr lang="en-US" dirty="0" err="1" smtClean="0"/>
+              <a:t>subquery</a:t>
+            </a:r>
+            <a:r>
+              <a:rPr lang="en-US" dirty="0"/>
+              <a:t/>
+            </a:r>
+            <a:br>
+              <a:rPr lang="en-US" dirty="0"/>
+            </a:br>
+            <a:r>
+              <a:rPr lang="en-US" dirty="0" smtClean="0"/>
+              <a:t>EXCEPT</a:t>
+            </a:r>
+            <a:endParaRPr lang="en-US" dirty="0"/>
+          </a:p>
+        </p:txBody>
+      </p:sp>
+      <p:sp>
+        <p:nvSpPr>
+          <p:cNvPr id="3" name="Content Placeholder 2"/>
+          <p:cNvSpPr>
+            <a:spLocks noGrp="1"/>
+          </p:cNvSpPr>
+          <p:nvPr>
+            <p:ph idx="1"/>
+          </p:nvPr>
+        </p:nvSpPr>
+        <p:spPr/>
+        <p:txBody>
+          <a:bodyPr/>
+          <a:lstStyle/>
+          <a:p>
+            <a:pPr marL="0" indent="0">
+              <a:buNone/>
+            </a:pPr>
+            <a:r>
+              <a:rPr lang="ru-RU" dirty="0" smtClean="0"/>
+              <a:t>	Вывести студентов, которые подали документы на </a:t>
+            </a:r>
+            <a:r>
+              <a:rPr lang="en-US" dirty="0" smtClean="0"/>
+              <a:t>‘CS’, </a:t>
+            </a:r>
+            <a:r>
+              <a:rPr lang="ru-RU" dirty="0" smtClean="0"/>
+              <a:t>но не подавали на </a:t>
+            </a:r>
+            <a:r>
+              <a:rPr lang="en-US" dirty="0" smtClean="0"/>
+              <a:t>‘EE’</a:t>
+            </a:r>
+          </a:p>
+        </p:txBody>
+      </p:sp>
+    </p:spTree>
+    <p:extLst>
+      <p:ext uri="{BB962C8B-B14F-4D97-AF65-F5344CB8AC3E}">
+        <p14:creationId xmlns:p14="http://schemas.microsoft.com/office/powerpoint/2010/main" val="1174610132"/>
+      </p:ext>
+    </p:extLst>
+  </p:cSld>
+  <p:clrMapOvr>
+    <a:masterClrMapping/>
+  </p:clrMapOvr>
+  <p:timing>
+    <p:tnLst>
+      <p:par>
+        <p:cTn id="1" dur="indefinite" restart="never" nodeType="tmRoot"/>
+      </p:par>
+    </p:tnLst>
+  </p:timing>
+</p:sld>
+</file>
+
+<file path=ppt/slides/slide15.xml><?xml version="1.0" encoding="utf-8"?>
+<p:sld xmlns:a="http://schemas.openxmlformats.org/drawingml/2006/main" xmlns:r="http://schemas.openxmlformats.org/officeDocument/2006/relationships" xmlns:p="http://schemas.openxmlformats.org/presentationml/2006/main">
+  <p:cSld>
+    <p:spTree>
+      <p:nvGrpSpPr>
+        <p:cNvPr id="1" name=""/>
+        <p:cNvGrpSpPr/>
+        <p:nvPr/>
+      </p:nvGrpSpPr>
+      <p:grpSpPr>
+        <a:xfrm>
+          <a:off x="0" y="0"/>
+          <a:ext cx="0" cy="0"/>
+          <a:chOff x="0" y="0"/>
+          <a:chExt cx="0" cy="0"/>
+        </a:xfrm>
+      </p:grpSpPr>
+      <p:sp>
+        <p:nvSpPr>
+          <p:cNvPr id="2" name="Title 1"/>
+          <p:cNvSpPr>
+            <a:spLocks noGrp="1"/>
+          </p:cNvSpPr>
+          <p:nvPr>
+            <p:ph type="title"/>
+          </p:nvPr>
+        </p:nvSpPr>
+        <p:spPr/>
+        <p:txBody>
+          <a:bodyPr/>
+          <a:lstStyle/>
+          <a:p>
+            <a:r>
+              <a:rPr lang="en-US" dirty="0" smtClean="0"/>
+              <a:t>Select </a:t>
+            </a:r>
+            <a:r>
+              <a:rPr lang="en-US" dirty="0" err="1" smtClean="0"/>
+              <a:t>subquery</a:t>
+            </a:r>
+            <a:r>
+              <a:rPr lang="en-US" dirty="0"/>
+              <a:t/>
+            </a:r>
+            <a:br>
+              <a:rPr lang="en-US" dirty="0"/>
+            </a:br>
+            <a:r>
+              <a:rPr lang="en-US" dirty="0" smtClean="0"/>
+              <a:t>EXCEPT</a:t>
+            </a:r>
+            <a:endParaRPr lang="en-US" dirty="0"/>
+          </a:p>
+        </p:txBody>
+      </p:sp>
+      <p:sp>
+        <p:nvSpPr>
+          <p:cNvPr id="3" name="Content Placeholder 2"/>
+          <p:cNvSpPr>
+            <a:spLocks noGrp="1"/>
+          </p:cNvSpPr>
+          <p:nvPr>
+            <p:ph idx="1"/>
+          </p:nvPr>
+        </p:nvSpPr>
+        <p:spPr>
+          <a:xfrm>
+            <a:off x="818347" y="2111002"/>
+            <a:ext cx="6701425" cy="4041162"/>
+          </a:xfrm>
+        </p:spPr>
+        <p:txBody>
+          <a:bodyPr/>
+          <a:lstStyle/>
+          <a:p>
+            <a:pPr marL="0" indent="0">
+              <a:buNone/>
+            </a:pPr>
+            <a:r>
+              <a:rPr lang="en-US" dirty="0" smtClean="0"/>
+              <a:t>	</a:t>
+            </a:r>
+            <a:r>
+              <a:rPr lang="en-US" dirty="0"/>
+              <a:t>select </a:t>
+            </a:r>
+            <a:r>
+              <a:rPr lang="en-US" dirty="0" err="1"/>
+              <a:t>sID,sName</a:t>
+            </a:r>
+            <a:r>
+              <a:rPr lang="en-US" dirty="0"/>
+              <a:t> from Student where </a:t>
+            </a:r>
+            <a:r>
+              <a:rPr lang="en-US" dirty="0" err="1"/>
+              <a:t>sID</a:t>
+            </a:r>
+            <a:r>
+              <a:rPr lang="en-US" dirty="0"/>
+              <a:t> </a:t>
+            </a:r>
+            <a:r>
+              <a:rPr lang="en-US" dirty="0" smtClean="0"/>
+              <a:t>in</a:t>
+            </a:r>
+          </a:p>
+          <a:p>
+            <a:pPr marL="0" indent="0">
+              <a:buNone/>
+            </a:pPr>
+            <a:r>
+              <a:rPr lang="en-US" dirty="0"/>
+              <a:t>	</a:t>
+            </a:r>
+            <a:r>
+              <a:rPr lang="en-US" dirty="0" smtClean="0"/>
+              <a:t>	(select </a:t>
+            </a:r>
+            <a:r>
+              <a:rPr lang="en-US" dirty="0" err="1"/>
+              <a:t>sID</a:t>
+            </a:r>
+            <a:r>
+              <a:rPr lang="en-US" dirty="0"/>
+              <a:t> from Apply where major='CS</a:t>
+            </a:r>
+            <a:r>
+              <a:rPr lang="en-US" dirty="0" smtClean="0"/>
+              <a:t>')</a:t>
+            </a:r>
+          </a:p>
+          <a:p>
+            <a:pPr marL="0" indent="0">
+              <a:buNone/>
+            </a:pPr>
+            <a:r>
+              <a:rPr lang="en-US" dirty="0"/>
+              <a:t>	</a:t>
+            </a:r>
+            <a:r>
+              <a:rPr lang="en-US" dirty="0" smtClean="0"/>
+              <a:t>except</a:t>
+            </a:r>
+          </a:p>
+          <a:p>
+            <a:pPr marL="0" indent="0">
+              <a:buNone/>
+            </a:pPr>
+            <a:r>
+              <a:rPr lang="en-US" dirty="0"/>
+              <a:t>	</a:t>
+            </a:r>
+            <a:r>
+              <a:rPr lang="en-US" dirty="0" smtClean="0"/>
+              <a:t>select </a:t>
+            </a:r>
+            <a:r>
+              <a:rPr lang="en-US" dirty="0" err="1"/>
+              <a:t>sID,sName</a:t>
+            </a:r>
+            <a:r>
+              <a:rPr lang="en-US" dirty="0"/>
+              <a:t> from Student where </a:t>
+            </a:r>
+            <a:r>
+              <a:rPr lang="en-US" dirty="0" err="1"/>
+              <a:t>sID</a:t>
+            </a:r>
+            <a:r>
+              <a:rPr lang="en-US" dirty="0"/>
+              <a:t> </a:t>
+            </a:r>
+            <a:r>
+              <a:rPr lang="en-US" dirty="0" smtClean="0"/>
+              <a:t>in</a:t>
+            </a:r>
+          </a:p>
+          <a:p>
+            <a:pPr marL="0" indent="0">
+              <a:buNone/>
+            </a:pPr>
+            <a:r>
+              <a:rPr lang="en-US" dirty="0"/>
+              <a:t>	</a:t>
+            </a:r>
+            <a:r>
+              <a:rPr lang="en-US" dirty="0" smtClean="0"/>
+              <a:t>	(select </a:t>
+            </a:r>
+            <a:r>
+              <a:rPr lang="en-US" dirty="0" err="1"/>
+              <a:t>sID</a:t>
+            </a:r>
+            <a:r>
+              <a:rPr lang="en-US" dirty="0"/>
+              <a:t> </a:t>
+            </a:r>
+            <a:r>
+              <a:rPr lang="en-US" dirty="0" smtClean="0"/>
+              <a:t>from Apply where major=‘EE’)</a:t>
+            </a:r>
+            <a:endParaRPr lang="en-US" dirty="0"/>
+          </a:p>
+        </p:txBody>
+      </p:sp>
+    </p:spTree>
+    <p:extLst>
+      <p:ext uri="{BB962C8B-B14F-4D97-AF65-F5344CB8AC3E}">
+        <p14:creationId xmlns:p14="http://schemas.microsoft.com/office/powerpoint/2010/main" val="533536607"/>
+      </p:ext>
+    </p:extLst>
+  </p:cSld>
+  <p:clrMapOvr>
+    <a:masterClrMapping/>
+  </p:clrMapOvr>
+  <p:timing>
+    <p:tnLst>
+      <p:par>
+        <p:cTn id="1" dur="indefinite" restart="never" nodeType="tmRoot"/>
+      </p:par>
+    </p:tnLst>
+  </p:timing>
+</p:sld>
+</file>
+
+<file path=ppt/slides/slide16.xml><?xml version="1.0" encoding="utf-8"?>
+<p:sld xmlns:a="http://schemas.openxmlformats.org/drawingml/2006/main" xmlns:r="http://schemas.openxmlformats.org/officeDocument/2006/relationships" xmlns:p="http://schemas.openxmlformats.org/presentationml/2006/main">
+  <p:cSld>
+    <p:spTree>
+      <p:nvGrpSpPr>
+        <p:cNvPr id="1" name=""/>
+        <p:cNvGrpSpPr/>
+        <p:nvPr/>
+      </p:nvGrpSpPr>
+      <p:grpSpPr>
+        <a:xfrm>
+          <a:off x="0" y="0"/>
+          <a:ext cx="0" cy="0"/>
+          <a:chOff x="0" y="0"/>
+          <a:chExt cx="0" cy="0"/>
+        </a:xfrm>
+      </p:grpSpPr>
+      <p:sp>
+        <p:nvSpPr>
+          <p:cNvPr id="2" name="Title 1"/>
+          <p:cNvSpPr>
+            <a:spLocks noGrp="1"/>
+          </p:cNvSpPr>
+          <p:nvPr>
+            <p:ph type="title"/>
+          </p:nvPr>
+        </p:nvSpPr>
+        <p:spPr/>
+        <p:txBody>
+          <a:bodyPr/>
+          <a:lstStyle/>
+          <a:p>
+            <a:r>
+              <a:rPr lang="en-US" dirty="0" smtClean="0"/>
+              <a:t>Select </a:t>
+            </a:r>
+            <a:r>
+              <a:rPr lang="en-US" dirty="0" err="1" smtClean="0"/>
+              <a:t>subquery</a:t>
+            </a:r>
+            <a:r>
+              <a:rPr lang="en-US" dirty="0"/>
+              <a:t/>
+            </a:r>
+            <a:br>
+              <a:rPr lang="en-US" dirty="0"/>
+            </a:br>
+            <a:r>
+              <a:rPr lang="en-US" dirty="0" smtClean="0"/>
+              <a:t>EXCEPT</a:t>
+            </a:r>
+            <a:endParaRPr lang="en-US" dirty="0"/>
+          </a:p>
+        </p:txBody>
+      </p:sp>
+      <p:sp>
+        <p:nvSpPr>
+          <p:cNvPr id="3" name="Content Placeholder 2"/>
+          <p:cNvSpPr>
+            <a:spLocks noGrp="1"/>
+          </p:cNvSpPr>
+          <p:nvPr>
+            <p:ph idx="1"/>
+          </p:nvPr>
+        </p:nvSpPr>
+        <p:spPr/>
+        <p:txBody>
+          <a:bodyPr/>
+          <a:lstStyle/>
+          <a:p>
+            <a:pPr marL="0" indent="0">
+              <a:buNone/>
+            </a:pPr>
+            <a:r>
+              <a:rPr lang="en-US" dirty="0" smtClean="0"/>
+              <a:t>	</a:t>
+            </a:r>
+            <a:r>
+              <a:rPr lang="en-US" dirty="0" smtClean="0"/>
+              <a:t>select </a:t>
+            </a:r>
+            <a:r>
+              <a:rPr lang="en-US" dirty="0" err="1" smtClean="0"/>
+              <a:t>sID</a:t>
+            </a:r>
+            <a:r>
+              <a:rPr lang="en-US" dirty="0" smtClean="0"/>
+              <a:t>, </a:t>
+            </a:r>
+            <a:r>
+              <a:rPr lang="en-US" dirty="0" err="1" smtClean="0"/>
+              <a:t>sName</a:t>
+            </a:r>
+            <a:endParaRPr lang="en-US" dirty="0" smtClean="0"/>
+          </a:p>
+          <a:p>
+            <a:pPr marL="0" indent="0">
+              <a:buNone/>
+            </a:pPr>
+            <a:r>
+              <a:rPr lang="en-US" dirty="0" smtClean="0"/>
+              <a:t>	</a:t>
+            </a:r>
+            <a:r>
+              <a:rPr lang="en-US" dirty="0" smtClean="0"/>
+              <a:t>from </a:t>
+            </a:r>
+            <a:r>
+              <a:rPr lang="en-US" dirty="0" err="1" smtClean="0"/>
+              <a:t>StudenT</a:t>
+            </a:r>
+            <a:endParaRPr lang="en-US" dirty="0" smtClean="0"/>
+          </a:p>
+          <a:p>
+            <a:pPr marL="0" indent="0">
+              <a:buNone/>
+            </a:pPr>
+            <a:r>
+              <a:rPr lang="en-US" dirty="0" smtClean="0"/>
+              <a:t>	</a:t>
+            </a:r>
+            <a:r>
+              <a:rPr lang="en-US" dirty="0" smtClean="0"/>
+              <a:t>where </a:t>
+            </a:r>
+            <a:r>
+              <a:rPr lang="en-US" dirty="0" err="1" smtClean="0"/>
+              <a:t>sID</a:t>
+            </a:r>
+            <a:r>
+              <a:rPr lang="en-US" dirty="0" smtClean="0"/>
+              <a:t> in (select </a:t>
+            </a:r>
+            <a:r>
+              <a:rPr lang="en-US" dirty="0" err="1" smtClean="0"/>
+              <a:t>sID</a:t>
+            </a:r>
+            <a:r>
+              <a:rPr lang="en-US" dirty="0" smtClean="0"/>
+              <a:t> from Apply where major = ‘CS’)</a:t>
+            </a:r>
+          </a:p>
+          <a:p>
+            <a:pPr marL="0" indent="0">
+              <a:buNone/>
+            </a:pPr>
+            <a:r>
+              <a:rPr lang="en-US" dirty="0"/>
+              <a:t>	</a:t>
+            </a:r>
+            <a:r>
+              <a:rPr lang="en-US" dirty="0" smtClean="0"/>
+              <a:t>	and </a:t>
+            </a:r>
+            <a:r>
+              <a:rPr lang="en-US" dirty="0" err="1" smtClean="0"/>
+              <a:t>sID</a:t>
+            </a:r>
+            <a:r>
+              <a:rPr lang="en-US" dirty="0" smtClean="0"/>
+              <a:t> not in (select </a:t>
+            </a:r>
+            <a:r>
+              <a:rPr lang="en-US" dirty="0" err="1" smtClean="0"/>
+              <a:t>sID</a:t>
+            </a:r>
+            <a:r>
+              <a:rPr lang="en-US" dirty="0" smtClean="0"/>
+              <a:t> from Apply where major = ‘EE’)</a:t>
+            </a:r>
+            <a:endParaRPr lang="en-US" dirty="0"/>
+          </a:p>
+        </p:txBody>
+      </p:sp>
+    </p:spTree>
+    <p:extLst>
+      <p:ext uri="{BB962C8B-B14F-4D97-AF65-F5344CB8AC3E}">
+        <p14:creationId xmlns:p14="http://schemas.microsoft.com/office/powerpoint/2010/main" val="3950165336"/>
+      </p:ext>
+    </p:extLst>
+  </p:cSld>
+  <p:clrMapOvr>
+    <a:masterClrMapping/>
+  </p:clrMapOvr>
+  <p:timing>
+    <p:tnLst>
+      <p:par>
+        <p:cTn id="1" dur="indefinite" restart="never" nodeType="tmRoot"/>
+      </p:par>
+    </p:tnLst>
+  </p:timing>
+</p:sld>
+</file>
+
+<file path=ppt/slides/slide17.xml><?xml version="1.0" encoding="utf-8"?>
+<p:sld xmlns:a="http://schemas.openxmlformats.org/drawingml/2006/main" xmlns:r="http://schemas.openxmlformats.org/officeDocument/2006/relationships" xmlns:p="http://schemas.openxmlformats.org/presentationml/2006/main">
+  <p:cSld>
+    <p:spTree>
+      <p:nvGrpSpPr>
+        <p:cNvPr id="1" name=""/>
+        <p:cNvGrpSpPr/>
+        <p:nvPr/>
+      </p:nvGrpSpPr>
+      <p:grpSpPr>
+        <a:xfrm>
+          <a:off x="0" y="0"/>
+          <a:ext cx="0" cy="0"/>
+          <a:chOff x="0" y="0"/>
+          <a:chExt cx="0" cy="0"/>
+        </a:xfrm>
+      </p:grpSpPr>
+      <p:sp>
+        <p:nvSpPr>
+          <p:cNvPr id="2" name="Title 1"/>
+          <p:cNvSpPr>
+            <a:spLocks noGrp="1"/>
+          </p:cNvSpPr>
+          <p:nvPr>
+            <p:ph type="title"/>
+          </p:nvPr>
+        </p:nvSpPr>
+        <p:spPr/>
+        <p:txBody>
+          <a:bodyPr/>
+          <a:lstStyle/>
+          <a:p>
+            <a:r>
+              <a:rPr lang="en-US" dirty="0" smtClean="0"/>
+              <a:t>Select </a:t>
+            </a:r>
+            <a:r>
+              <a:rPr lang="en-US" dirty="0" err="1" smtClean="0"/>
+              <a:t>subquery</a:t>
+            </a:r>
+            <a:endParaRPr lang="en-US" dirty="0"/>
+          </a:p>
+        </p:txBody>
+      </p:sp>
+      <p:sp>
+        <p:nvSpPr>
+          <p:cNvPr id="3" name="Content Placeholder 2"/>
+          <p:cNvSpPr>
+            <a:spLocks noGrp="1"/>
+          </p:cNvSpPr>
+          <p:nvPr>
+            <p:ph idx="1"/>
+          </p:nvPr>
+        </p:nvSpPr>
+        <p:spPr>
+          <a:xfrm>
+            <a:off x="676405" y="2060898"/>
+            <a:ext cx="7903924" cy="4041162"/>
+          </a:xfrm>
+        </p:spPr>
+        <p:txBody>
+          <a:bodyPr/>
+          <a:lstStyle/>
+          <a:p>
+            <a:pPr marL="0" indent="0">
+              <a:buNone/>
+            </a:pPr>
+            <a:r>
+              <a:rPr lang="en-US" dirty="0" smtClean="0"/>
+              <a:t>	</a:t>
+            </a:r>
+            <a:r>
+              <a:rPr lang="ru-RU" dirty="0" smtClean="0"/>
+              <a:t>Если в регионе больше одного университета, вернуть их названия.</a:t>
+            </a:r>
+            <a:endParaRPr lang="en-US" dirty="0"/>
+          </a:p>
+        </p:txBody>
+      </p:sp>
+    </p:spTree>
+    <p:extLst>
+      <p:ext uri="{BB962C8B-B14F-4D97-AF65-F5344CB8AC3E}">
+        <p14:creationId xmlns:p14="http://schemas.microsoft.com/office/powerpoint/2010/main" val="138484394"/>
+      </p:ext>
+    </p:extLst>
+  </p:cSld>
+  <p:clrMapOvr>
+    <a:masterClrMapping/>
+  </p:clrMapOvr>
+  <p:timing>
+    <p:tnLst>
+      <p:par>
+        <p:cTn id="1" dur="indefinite" restart="never" nodeType="tmRoot"/>
+      </p:par>
+    </p:tnLst>
+  </p:timing>
+</p:sld>
+</file>
+
+<file path=ppt/slides/slide18.xml><?xml version="1.0" encoding="utf-8"?>
+<p:sld xmlns:a="http://schemas.openxmlformats.org/drawingml/2006/main" xmlns:r="http://schemas.openxmlformats.org/officeDocument/2006/relationships" xmlns:p="http://schemas.openxmlformats.org/presentationml/2006/main">
+  <p:cSld>
+    <p:spTree>
+      <p:nvGrpSpPr>
+        <p:cNvPr id="1" name=""/>
+        <p:cNvGrpSpPr/>
+        <p:nvPr/>
+      </p:nvGrpSpPr>
+      <p:grpSpPr>
+        <a:xfrm>
+          <a:off x="0" y="0"/>
+          <a:ext cx="0" cy="0"/>
+          <a:chOff x="0" y="0"/>
+          <a:chExt cx="0" cy="0"/>
+        </a:xfrm>
+      </p:grpSpPr>
+      <p:sp>
+        <p:nvSpPr>
+          <p:cNvPr id="2" name="Title 1"/>
+          <p:cNvSpPr>
+            <a:spLocks noGrp="1"/>
+          </p:cNvSpPr>
+          <p:nvPr>
+            <p:ph type="title"/>
+          </p:nvPr>
+        </p:nvSpPr>
+        <p:spPr/>
+        <p:txBody>
+          <a:bodyPr/>
+          <a:lstStyle/>
+          <a:p>
+            <a:r>
+              <a:rPr lang="en-US" dirty="0" smtClean="0"/>
+              <a:t>Select </a:t>
+            </a:r>
+            <a:r>
+              <a:rPr lang="en-US" dirty="0" err="1" smtClean="0"/>
+              <a:t>subquery</a:t>
+            </a:r>
+            <a:r>
+              <a:rPr lang="en-US" dirty="0"/>
+              <a:t/>
+            </a:r>
+            <a:br>
+              <a:rPr lang="en-US" dirty="0"/>
+            </a:br>
+            <a:r>
+              <a:rPr lang="en-US" dirty="0" smtClean="0"/>
+              <a:t>EXISTS</a:t>
+            </a:r>
+            <a:endParaRPr lang="en-US" dirty="0"/>
+          </a:p>
+        </p:txBody>
+      </p:sp>
+      <p:sp>
+        <p:nvSpPr>
+          <p:cNvPr id="3" name="Content Placeholder 2"/>
+          <p:cNvSpPr>
+            <a:spLocks noGrp="1"/>
+          </p:cNvSpPr>
+          <p:nvPr>
+            <p:ph idx="1"/>
+          </p:nvPr>
+        </p:nvSpPr>
+        <p:spPr/>
+        <p:txBody>
+          <a:bodyPr/>
+          <a:lstStyle/>
+          <a:p>
+            <a:pPr marL="0" indent="0">
+              <a:buNone/>
+            </a:pPr>
+            <a:r>
+              <a:rPr lang="en-US" dirty="0" smtClean="0"/>
+              <a:t>	</a:t>
+            </a:r>
+            <a:r>
+              <a:rPr lang="en-US" dirty="0" smtClean="0"/>
+              <a:t>select </a:t>
+            </a:r>
+            <a:r>
+              <a:rPr lang="en-US" dirty="0" err="1" smtClean="0"/>
+              <a:t>uName</a:t>
+            </a:r>
+            <a:r>
+              <a:rPr lang="en-US" dirty="0" smtClean="0"/>
+              <a:t>, region</a:t>
+            </a:r>
+            <a:endParaRPr lang="en-US" dirty="0" smtClean="0"/>
+          </a:p>
+          <a:p>
+            <a:pPr marL="0" indent="0">
+              <a:buNone/>
+            </a:pPr>
+            <a:r>
+              <a:rPr lang="en-US" dirty="0" smtClean="0"/>
+              <a:t>	</a:t>
+            </a:r>
+            <a:r>
+              <a:rPr lang="en-US" dirty="0" smtClean="0"/>
+              <a:t>from University U1</a:t>
+            </a:r>
+            <a:endParaRPr lang="en-US" dirty="0" smtClean="0"/>
+          </a:p>
+          <a:p>
+            <a:pPr marL="0" indent="0">
+              <a:buNone/>
+            </a:pPr>
+            <a:r>
+              <a:rPr lang="en-US" dirty="0" smtClean="0"/>
+              <a:t>	</a:t>
+            </a:r>
+            <a:r>
+              <a:rPr lang="en-US" dirty="0" smtClean="0"/>
+              <a:t>where exists</a:t>
+            </a:r>
+          </a:p>
+          <a:p>
+            <a:pPr marL="0" indent="0">
+              <a:buNone/>
+            </a:pPr>
+            <a:r>
+              <a:rPr lang="en-US" dirty="0" smtClean="0"/>
+              <a:t>		(select * from University U2 where U1.region = U2.region)</a:t>
+            </a:r>
+            <a:endParaRPr lang="en-US" dirty="0"/>
+          </a:p>
+        </p:txBody>
+      </p:sp>
+    </p:spTree>
+    <p:extLst>
+      <p:ext uri="{BB962C8B-B14F-4D97-AF65-F5344CB8AC3E}">
+        <p14:creationId xmlns:p14="http://schemas.microsoft.com/office/powerpoint/2010/main" val="381923487"/>
+      </p:ext>
+    </p:extLst>
+  </p:cSld>
+  <p:clrMapOvr>
+    <a:masterClrMapping/>
+  </p:clrMapOvr>
+  <p:timing>
+    <p:tnLst>
+      <p:par>
+        <p:cTn id="1" dur="indefinite" restart="never" nodeType="tmRoot"/>
+      </p:par>
+    </p:tnLst>
+  </p:timing>
+</p:sld>
+</file>
+
+<file path=ppt/slides/slide19.xml><?xml version="1.0" encoding="utf-8"?>
+<p:sld xmlns:a="http://schemas.openxmlformats.org/drawingml/2006/main" xmlns:r="http://schemas.openxmlformats.org/officeDocument/2006/relationships" xmlns:p="http://schemas.openxmlformats.org/presentationml/2006/main">
+  <p:cSld>
+    <p:spTree>
+      <p:nvGrpSpPr>
+        <p:cNvPr id="1" name=""/>
+        <p:cNvGrpSpPr/>
+        <p:nvPr/>
+      </p:nvGrpSpPr>
+      <p:grpSpPr>
+        <a:xfrm>
+          <a:off x="0" y="0"/>
+          <a:ext cx="0" cy="0"/>
+          <a:chOff x="0" y="0"/>
+          <a:chExt cx="0" cy="0"/>
+        </a:xfrm>
+      </p:grpSpPr>
+      <p:sp>
+        <p:nvSpPr>
+          <p:cNvPr id="2" name="Title 1"/>
+          <p:cNvSpPr>
+            <a:spLocks noGrp="1"/>
+          </p:cNvSpPr>
+          <p:nvPr>
+            <p:ph type="title"/>
+          </p:nvPr>
+        </p:nvSpPr>
+        <p:spPr/>
+        <p:txBody>
+          <a:bodyPr/>
+          <a:lstStyle/>
+          <a:p>
+            <a:r>
+              <a:rPr lang="en-US" dirty="0" smtClean="0"/>
+              <a:t>Select </a:t>
+            </a:r>
+            <a:r>
+              <a:rPr lang="en-US" dirty="0" err="1" smtClean="0"/>
+              <a:t>subquery</a:t>
+            </a:r>
+            <a:r>
+              <a:rPr lang="en-US" dirty="0"/>
+              <a:t/>
+            </a:r>
+            <a:br>
+              <a:rPr lang="en-US" dirty="0"/>
+            </a:br>
+            <a:r>
+              <a:rPr lang="en-US" dirty="0" smtClean="0"/>
+              <a:t>EXISTS</a:t>
+            </a:r>
+            <a:endParaRPr lang="en-US" dirty="0"/>
+          </a:p>
+        </p:txBody>
+      </p:sp>
+      <p:sp>
+        <p:nvSpPr>
+          <p:cNvPr id="3" name="Content Placeholder 2"/>
+          <p:cNvSpPr>
+            <a:spLocks noGrp="1"/>
+          </p:cNvSpPr>
+          <p:nvPr>
+            <p:ph idx="1"/>
+          </p:nvPr>
+        </p:nvSpPr>
+        <p:spPr/>
+        <p:txBody>
+          <a:bodyPr/>
+          <a:lstStyle/>
+          <a:p>
+            <a:pPr marL="0" indent="0">
+              <a:buNone/>
+            </a:pPr>
+            <a:r>
+              <a:rPr lang="en-US" dirty="0" smtClean="0"/>
+              <a:t>	</a:t>
+            </a:r>
+            <a:r>
+              <a:rPr lang="en-US" dirty="0" smtClean="0"/>
+              <a:t>select </a:t>
+            </a:r>
+            <a:r>
+              <a:rPr lang="en-US" dirty="0" err="1" smtClean="0"/>
+              <a:t>uName</a:t>
+            </a:r>
+            <a:r>
+              <a:rPr lang="en-US" dirty="0" smtClean="0"/>
+              <a:t>, region</a:t>
+            </a:r>
+            <a:endParaRPr lang="en-US" dirty="0" smtClean="0"/>
+          </a:p>
+          <a:p>
+            <a:pPr marL="0" indent="0">
+              <a:buNone/>
+            </a:pPr>
+            <a:r>
+              <a:rPr lang="en-US" dirty="0" smtClean="0"/>
+              <a:t>	</a:t>
+            </a:r>
+            <a:r>
+              <a:rPr lang="en-US" dirty="0" smtClean="0"/>
+              <a:t>from University U1</a:t>
+            </a:r>
+            <a:endParaRPr lang="en-US" dirty="0" smtClean="0"/>
+          </a:p>
+          <a:p>
+            <a:pPr marL="0" indent="0">
+              <a:buNone/>
+            </a:pPr>
+            <a:r>
+              <a:rPr lang="en-US" dirty="0" smtClean="0"/>
+              <a:t>	</a:t>
+            </a:r>
+            <a:r>
+              <a:rPr lang="en-US" dirty="0" smtClean="0"/>
+              <a:t>where exists</a:t>
+            </a:r>
+          </a:p>
+          <a:p>
+            <a:pPr marL="0" indent="0">
+              <a:buNone/>
+            </a:pPr>
+            <a:r>
+              <a:rPr lang="en-US" dirty="0" smtClean="0"/>
+              <a:t>		(select * from University U2 where</a:t>
+            </a:r>
+          </a:p>
+          <a:p>
+            <a:pPr marL="0" indent="0">
+              <a:buNone/>
+            </a:pPr>
+            <a:r>
+              <a:rPr lang="en-US" dirty="0"/>
+              <a:t>	</a:t>
+            </a:r>
+            <a:r>
+              <a:rPr lang="en-US" dirty="0" smtClean="0"/>
+              <a:t>		</a:t>
+            </a:r>
+            <a:r>
+              <a:rPr lang="en-US" dirty="0" smtClean="0"/>
+              <a:t>U1.region = U2.region</a:t>
+            </a:r>
+            <a:r>
+              <a:rPr lang="ru-RU" dirty="0" smtClean="0"/>
+              <a:t> </a:t>
+            </a:r>
+            <a:r>
+              <a:rPr lang="en-US" dirty="0" smtClean="0"/>
+              <a:t>and</a:t>
+            </a:r>
+          </a:p>
+          <a:p>
+            <a:pPr marL="0" indent="0">
+              <a:buNone/>
+            </a:pPr>
+            <a:r>
+              <a:rPr lang="en-US" dirty="0"/>
+              <a:t>	</a:t>
+            </a:r>
+            <a:r>
+              <a:rPr lang="en-US" dirty="0" smtClean="0"/>
+              <a:t>		U1.uName &lt;&gt; U2.uName</a:t>
+            </a:r>
+            <a:r>
+              <a:rPr lang="en-US" dirty="0" smtClean="0"/>
+              <a:t>)</a:t>
+            </a:r>
+            <a:endParaRPr lang="en-US" dirty="0"/>
+          </a:p>
+        </p:txBody>
+      </p:sp>
+    </p:spTree>
+    <p:extLst>
+      <p:ext uri="{BB962C8B-B14F-4D97-AF65-F5344CB8AC3E}">
+        <p14:creationId xmlns:p14="http://schemas.microsoft.com/office/powerpoint/2010/main" val="562645235"/>
+      </p:ext>
+    </p:extLst>
+  </p:cSld>
+  <p:clrMapOvr>
+    <a:masterClrMapping/>
+  </p:clrMapOvr>
+  <p:timing>
+    <p:tnLst>
+      <p:par>
+        <p:cTn id="1" dur="indefinite" restart="never" nodeType="tmRoot"/>
+      </p:par>
+    </p:tnLst>
+  </p:timing>
+</p:sld>
+</file>
+
 <file path=ppt/slides/slide2.xml><?xml version="1.0" encoding="utf-8"?>
 <p:sld xmlns:a="http://schemas.openxmlformats.org/drawingml/2006/main" xmlns:r="http://schemas.openxmlformats.org/officeDocument/2006/relationships" xmlns:p="http://schemas.openxmlformats.org/presentationml/2006/main">
   <p:cSld>
@@ -6927,6 +9196,1876 @@
     <p:extLst>
       <p:ext uri="{BB962C8B-B14F-4D97-AF65-F5344CB8AC3E}">
         <p14:creationId xmlns:p14="http://schemas.microsoft.com/office/powerpoint/2010/main" val="2576379856"/>
+      </p:ext>
+    </p:extLst>
+  </p:cSld>
+  <p:clrMapOvr>
+    <a:masterClrMapping/>
+  </p:clrMapOvr>
+  <p:timing>
+    <p:tnLst>
+      <p:par>
+        <p:cTn id="1" dur="indefinite" restart="never" nodeType="tmRoot"/>
+      </p:par>
+    </p:tnLst>
+  </p:timing>
+</p:sld>
+</file>
+
+<file path=ppt/slides/slide20.xml><?xml version="1.0" encoding="utf-8"?>
+<p:sld xmlns:a="http://schemas.openxmlformats.org/drawingml/2006/main" xmlns:r="http://schemas.openxmlformats.org/officeDocument/2006/relationships" xmlns:p="http://schemas.openxmlformats.org/presentationml/2006/main">
+  <p:cSld>
+    <p:spTree>
+      <p:nvGrpSpPr>
+        <p:cNvPr id="1" name=""/>
+        <p:cNvGrpSpPr/>
+        <p:nvPr/>
+      </p:nvGrpSpPr>
+      <p:grpSpPr>
+        <a:xfrm>
+          <a:off x="0" y="0"/>
+          <a:ext cx="0" cy="0"/>
+          <a:chOff x="0" y="0"/>
+          <a:chExt cx="0" cy="0"/>
+        </a:xfrm>
+      </p:grpSpPr>
+      <p:sp>
+        <p:nvSpPr>
+          <p:cNvPr id="2" name="Title 1"/>
+          <p:cNvSpPr>
+            <a:spLocks noGrp="1"/>
+          </p:cNvSpPr>
+          <p:nvPr>
+            <p:ph type="title"/>
+          </p:nvPr>
+        </p:nvSpPr>
+        <p:spPr/>
+        <p:txBody>
+          <a:bodyPr/>
+          <a:lstStyle/>
+          <a:p>
+            <a:r>
+              <a:rPr lang="en-US" dirty="0" smtClean="0"/>
+              <a:t>Select </a:t>
+            </a:r>
+            <a:r>
+              <a:rPr lang="en-US" dirty="0" err="1" smtClean="0"/>
+              <a:t>subquery</a:t>
+            </a:r>
+            <a:r>
+              <a:rPr lang="en-US" dirty="0"/>
+              <a:t/>
+            </a:r>
+            <a:br>
+              <a:rPr lang="en-US" dirty="0"/>
+            </a:br>
+            <a:r>
+              <a:rPr lang="en-US" dirty="0" smtClean="0"/>
+              <a:t>EXISTS</a:t>
+            </a:r>
+            <a:endParaRPr lang="en-US" dirty="0"/>
+          </a:p>
+        </p:txBody>
+      </p:sp>
+      <p:sp>
+        <p:nvSpPr>
+          <p:cNvPr id="3" name="Content Placeholder 2"/>
+          <p:cNvSpPr>
+            <a:spLocks noGrp="1"/>
+          </p:cNvSpPr>
+          <p:nvPr>
+            <p:ph idx="1"/>
+          </p:nvPr>
+        </p:nvSpPr>
+        <p:spPr/>
+        <p:txBody>
+          <a:bodyPr/>
+          <a:lstStyle/>
+          <a:p>
+            <a:pPr marL="0" indent="0">
+              <a:buNone/>
+            </a:pPr>
+            <a:r>
+              <a:rPr lang="en-US" dirty="0" smtClean="0"/>
+              <a:t>	</a:t>
+            </a:r>
+            <a:r>
+              <a:rPr lang="ru-RU" dirty="0" smtClean="0"/>
+              <a:t>Распечатать названия университетов с максимальным количеством заявлений</a:t>
+            </a:r>
+            <a:r>
+              <a:rPr lang="en-US" dirty="0" smtClean="0"/>
+              <a:t>.</a:t>
+            </a:r>
+            <a:endParaRPr lang="en-US" dirty="0"/>
+          </a:p>
+        </p:txBody>
+      </p:sp>
+    </p:spTree>
+    <p:extLst>
+      <p:ext uri="{BB962C8B-B14F-4D97-AF65-F5344CB8AC3E}">
+        <p14:creationId xmlns:p14="http://schemas.microsoft.com/office/powerpoint/2010/main" val="2532233859"/>
+      </p:ext>
+    </p:extLst>
+  </p:cSld>
+  <p:clrMapOvr>
+    <a:masterClrMapping/>
+  </p:clrMapOvr>
+  <p:timing>
+    <p:tnLst>
+      <p:par>
+        <p:cTn id="1" dur="indefinite" restart="never" nodeType="tmRoot"/>
+      </p:par>
+    </p:tnLst>
+  </p:timing>
+</p:sld>
+</file>
+
+<file path=ppt/slides/slide21.xml><?xml version="1.0" encoding="utf-8"?>
+<p:sld xmlns:a="http://schemas.openxmlformats.org/drawingml/2006/main" xmlns:r="http://schemas.openxmlformats.org/officeDocument/2006/relationships" xmlns:p="http://schemas.openxmlformats.org/presentationml/2006/main">
+  <p:cSld>
+    <p:spTree>
+      <p:nvGrpSpPr>
+        <p:cNvPr id="1" name=""/>
+        <p:cNvGrpSpPr/>
+        <p:nvPr/>
+      </p:nvGrpSpPr>
+      <p:grpSpPr>
+        <a:xfrm>
+          <a:off x="0" y="0"/>
+          <a:ext cx="0" cy="0"/>
+          <a:chOff x="0" y="0"/>
+          <a:chExt cx="0" cy="0"/>
+        </a:xfrm>
+      </p:grpSpPr>
+      <p:sp>
+        <p:nvSpPr>
+          <p:cNvPr id="2" name="Title 1"/>
+          <p:cNvSpPr>
+            <a:spLocks noGrp="1"/>
+          </p:cNvSpPr>
+          <p:nvPr>
+            <p:ph type="title"/>
+          </p:nvPr>
+        </p:nvSpPr>
+        <p:spPr/>
+        <p:txBody>
+          <a:bodyPr/>
+          <a:lstStyle/>
+          <a:p>
+            <a:r>
+              <a:rPr lang="en-US" dirty="0" smtClean="0"/>
+              <a:t>Select </a:t>
+            </a:r>
+            <a:r>
+              <a:rPr lang="en-US" dirty="0" err="1" smtClean="0"/>
+              <a:t>subquery</a:t>
+            </a:r>
+            <a:r>
+              <a:rPr lang="en-US" dirty="0"/>
+              <a:t/>
+            </a:r>
+            <a:br>
+              <a:rPr lang="en-US" dirty="0"/>
+            </a:br>
+            <a:r>
+              <a:rPr lang="en-US" dirty="0" smtClean="0"/>
+              <a:t>EXISTS</a:t>
+            </a:r>
+            <a:endParaRPr lang="en-US" dirty="0"/>
+          </a:p>
+        </p:txBody>
+      </p:sp>
+      <p:sp>
+        <p:nvSpPr>
+          <p:cNvPr id="3" name="Content Placeholder 2"/>
+          <p:cNvSpPr>
+            <a:spLocks noGrp="1"/>
+          </p:cNvSpPr>
+          <p:nvPr>
+            <p:ph idx="1"/>
+          </p:nvPr>
+        </p:nvSpPr>
+        <p:spPr/>
+        <p:txBody>
+          <a:bodyPr/>
+          <a:lstStyle/>
+          <a:p>
+            <a:pPr marL="0" indent="0">
+              <a:buNone/>
+            </a:pPr>
+            <a:r>
+              <a:rPr lang="en-US" dirty="0" smtClean="0"/>
+              <a:t>	</a:t>
+            </a:r>
+            <a:r>
+              <a:rPr lang="en-US" dirty="0" smtClean="0"/>
+              <a:t>Select </a:t>
+            </a:r>
+            <a:r>
+              <a:rPr lang="en-US" dirty="0" err="1" smtClean="0"/>
+              <a:t>uName</a:t>
+            </a:r>
+            <a:r>
+              <a:rPr lang="en-US" dirty="0" smtClean="0"/>
+              <a:t> from University U1</a:t>
+            </a:r>
+          </a:p>
+          <a:p>
+            <a:pPr marL="0" indent="0">
+              <a:buNone/>
+            </a:pPr>
+            <a:r>
+              <a:rPr lang="en-US" dirty="0"/>
+              <a:t>	</a:t>
+            </a:r>
+            <a:r>
+              <a:rPr lang="en-US" dirty="0" smtClean="0"/>
+              <a:t>where not exists (</a:t>
+            </a:r>
+          </a:p>
+          <a:p>
+            <a:pPr marL="0" indent="0">
+              <a:buNone/>
+            </a:pPr>
+            <a:r>
+              <a:rPr lang="en-US" dirty="0"/>
+              <a:t>	</a:t>
+            </a:r>
+            <a:r>
+              <a:rPr lang="en-US" dirty="0" smtClean="0"/>
+              <a:t>	select * from University U2</a:t>
+            </a:r>
+          </a:p>
+          <a:p>
+            <a:pPr marL="0" indent="0">
+              <a:buNone/>
+            </a:pPr>
+            <a:r>
+              <a:rPr lang="en-US" dirty="0"/>
+              <a:t>	</a:t>
+            </a:r>
+            <a:r>
+              <a:rPr lang="en-US" dirty="0" smtClean="0"/>
+              <a:t>	where C2.enrollment &gt; C1.enrollment)</a:t>
+            </a:r>
+            <a:endParaRPr lang="en-US" dirty="0"/>
+          </a:p>
+        </p:txBody>
+      </p:sp>
+    </p:spTree>
+    <p:extLst>
+      <p:ext uri="{BB962C8B-B14F-4D97-AF65-F5344CB8AC3E}">
+        <p14:creationId xmlns:p14="http://schemas.microsoft.com/office/powerpoint/2010/main" val="1031733100"/>
+      </p:ext>
+    </p:extLst>
+  </p:cSld>
+  <p:clrMapOvr>
+    <a:masterClrMapping/>
+  </p:clrMapOvr>
+  <p:timing>
+    <p:tnLst>
+      <p:par>
+        <p:cTn id="1" dur="indefinite" restart="never" nodeType="tmRoot"/>
+      </p:par>
+    </p:tnLst>
+  </p:timing>
+</p:sld>
+</file>
+
+<file path=ppt/slides/slide22.xml><?xml version="1.0" encoding="utf-8"?>
+<p:sld xmlns:a="http://schemas.openxmlformats.org/drawingml/2006/main" xmlns:r="http://schemas.openxmlformats.org/officeDocument/2006/relationships" xmlns:p="http://schemas.openxmlformats.org/presentationml/2006/main">
+  <p:cSld>
+    <p:spTree>
+      <p:nvGrpSpPr>
+        <p:cNvPr id="1" name=""/>
+        <p:cNvGrpSpPr/>
+        <p:nvPr/>
+      </p:nvGrpSpPr>
+      <p:grpSpPr>
+        <a:xfrm>
+          <a:off x="0" y="0"/>
+          <a:ext cx="0" cy="0"/>
+          <a:chOff x="0" y="0"/>
+          <a:chExt cx="0" cy="0"/>
+        </a:xfrm>
+      </p:grpSpPr>
+      <p:sp>
+        <p:nvSpPr>
+          <p:cNvPr id="2" name="Title 1"/>
+          <p:cNvSpPr>
+            <a:spLocks noGrp="1"/>
+          </p:cNvSpPr>
+          <p:nvPr>
+            <p:ph type="title"/>
+          </p:nvPr>
+        </p:nvSpPr>
+        <p:spPr/>
+        <p:txBody>
+          <a:bodyPr/>
+          <a:lstStyle/>
+          <a:p>
+            <a:r>
+              <a:rPr lang="en-US" dirty="0" smtClean="0"/>
+              <a:t>Select </a:t>
+            </a:r>
+            <a:r>
+              <a:rPr lang="en-US" dirty="0" err="1" smtClean="0"/>
+              <a:t>subquery</a:t>
+            </a:r>
+            <a:r>
+              <a:rPr lang="en-US" dirty="0"/>
+              <a:t/>
+            </a:r>
+            <a:br>
+              <a:rPr lang="en-US" dirty="0"/>
+            </a:br>
+            <a:r>
+              <a:rPr lang="en-US" dirty="0" smtClean="0"/>
+              <a:t>EXISTS</a:t>
+            </a:r>
+            <a:endParaRPr lang="en-US" dirty="0"/>
+          </a:p>
+        </p:txBody>
+      </p:sp>
+      <p:sp>
+        <p:nvSpPr>
+          <p:cNvPr id="3" name="Content Placeholder 2"/>
+          <p:cNvSpPr>
+            <a:spLocks noGrp="1"/>
+          </p:cNvSpPr>
+          <p:nvPr>
+            <p:ph idx="1"/>
+          </p:nvPr>
+        </p:nvSpPr>
+        <p:spPr/>
+        <p:txBody>
+          <a:bodyPr/>
+          <a:lstStyle/>
+          <a:p>
+            <a:pPr marL="0" indent="0">
+              <a:buNone/>
+            </a:pPr>
+            <a:r>
+              <a:rPr lang="en-US" dirty="0" smtClean="0"/>
+              <a:t>	</a:t>
+            </a:r>
+            <a:r>
+              <a:rPr lang="ru-RU" dirty="0" smtClean="0"/>
+              <a:t>Вывести студентов с максимальным </a:t>
+            </a:r>
+            <a:r>
+              <a:rPr lang="en-US" dirty="0" smtClean="0"/>
+              <a:t>GPA</a:t>
+            </a:r>
+            <a:endParaRPr lang="en-US" dirty="0"/>
+          </a:p>
+        </p:txBody>
+      </p:sp>
+    </p:spTree>
+    <p:extLst>
+      <p:ext uri="{BB962C8B-B14F-4D97-AF65-F5344CB8AC3E}">
+        <p14:creationId xmlns:p14="http://schemas.microsoft.com/office/powerpoint/2010/main" val="2454653157"/>
+      </p:ext>
+    </p:extLst>
+  </p:cSld>
+  <p:clrMapOvr>
+    <a:masterClrMapping/>
+  </p:clrMapOvr>
+  <p:timing>
+    <p:tnLst>
+      <p:par>
+        <p:cTn id="1" dur="indefinite" restart="never" nodeType="tmRoot"/>
+      </p:par>
+    </p:tnLst>
+  </p:timing>
+</p:sld>
+</file>
+
+<file path=ppt/slides/slide23.xml><?xml version="1.0" encoding="utf-8"?>
+<p:sld xmlns:a="http://schemas.openxmlformats.org/drawingml/2006/main" xmlns:r="http://schemas.openxmlformats.org/officeDocument/2006/relationships" xmlns:p="http://schemas.openxmlformats.org/presentationml/2006/main">
+  <p:cSld>
+    <p:spTree>
+      <p:nvGrpSpPr>
+        <p:cNvPr id="1" name=""/>
+        <p:cNvGrpSpPr/>
+        <p:nvPr/>
+      </p:nvGrpSpPr>
+      <p:grpSpPr>
+        <a:xfrm>
+          <a:off x="0" y="0"/>
+          <a:ext cx="0" cy="0"/>
+          <a:chOff x="0" y="0"/>
+          <a:chExt cx="0" cy="0"/>
+        </a:xfrm>
+      </p:grpSpPr>
+      <p:sp>
+        <p:nvSpPr>
+          <p:cNvPr id="2" name="Title 1"/>
+          <p:cNvSpPr>
+            <a:spLocks noGrp="1"/>
+          </p:cNvSpPr>
+          <p:nvPr>
+            <p:ph type="title"/>
+          </p:nvPr>
+        </p:nvSpPr>
+        <p:spPr/>
+        <p:txBody>
+          <a:bodyPr/>
+          <a:lstStyle/>
+          <a:p>
+            <a:r>
+              <a:rPr lang="en-US" dirty="0" smtClean="0"/>
+              <a:t>Select </a:t>
+            </a:r>
+            <a:r>
+              <a:rPr lang="en-US" dirty="0" err="1" smtClean="0"/>
+              <a:t>subquery</a:t>
+            </a:r>
+            <a:r>
+              <a:rPr lang="en-US" dirty="0"/>
+              <a:t/>
+            </a:r>
+            <a:br>
+              <a:rPr lang="en-US" dirty="0"/>
+            </a:br>
+            <a:r>
+              <a:rPr lang="en-US" dirty="0" smtClean="0"/>
+              <a:t>EXISTS</a:t>
+            </a:r>
+            <a:endParaRPr lang="en-US" dirty="0"/>
+          </a:p>
+        </p:txBody>
+      </p:sp>
+      <p:sp>
+        <p:nvSpPr>
+          <p:cNvPr id="3" name="Content Placeholder 2"/>
+          <p:cNvSpPr>
+            <a:spLocks noGrp="1"/>
+          </p:cNvSpPr>
+          <p:nvPr>
+            <p:ph idx="1"/>
+          </p:nvPr>
+        </p:nvSpPr>
+        <p:spPr/>
+        <p:txBody>
+          <a:bodyPr>
+            <a:normAutofit fontScale="92500" lnSpcReduction="10000"/>
+          </a:bodyPr>
+          <a:lstStyle/>
+          <a:p>
+            <a:pPr marL="0" indent="0">
+              <a:buNone/>
+            </a:pPr>
+            <a:r>
+              <a:rPr lang="en-US" dirty="0" smtClean="0"/>
+              <a:t>	</a:t>
+            </a:r>
+            <a:r>
+              <a:rPr lang="en-US" dirty="0" smtClean="0"/>
+              <a:t>Select </a:t>
+            </a:r>
+            <a:r>
+              <a:rPr lang="en-US" dirty="0" err="1" smtClean="0"/>
+              <a:t>sName,GPA</a:t>
+            </a:r>
+            <a:endParaRPr lang="en-US" dirty="0" smtClean="0"/>
+          </a:p>
+          <a:p>
+            <a:pPr marL="0" indent="0">
+              <a:buNone/>
+            </a:pPr>
+            <a:r>
+              <a:rPr lang="en-US" dirty="0"/>
+              <a:t>	</a:t>
+            </a:r>
+            <a:r>
+              <a:rPr lang="en-US" dirty="0" smtClean="0"/>
+              <a:t>from Student S1</a:t>
+            </a:r>
+          </a:p>
+          <a:p>
+            <a:pPr marL="0" indent="0">
+              <a:buNone/>
+            </a:pPr>
+            <a:r>
+              <a:rPr lang="en-US" dirty="0" smtClean="0"/>
+              <a:t>	where not exists (</a:t>
+            </a:r>
+          </a:p>
+          <a:p>
+            <a:pPr marL="0" indent="0">
+              <a:buNone/>
+            </a:pPr>
+            <a:r>
+              <a:rPr lang="en-US" dirty="0"/>
+              <a:t>	</a:t>
+            </a:r>
+            <a:r>
+              <a:rPr lang="en-US" dirty="0" smtClean="0"/>
+              <a:t>	</a:t>
+            </a:r>
+            <a:r>
+              <a:rPr lang="en-US" dirty="0" smtClean="0"/>
+              <a:t>Select * from Student S2 where S2.GPA &gt; S1.GPA)</a:t>
+            </a:r>
+          </a:p>
+          <a:p>
+            <a:pPr marL="0" indent="0">
+              <a:buNone/>
+            </a:pPr>
+            <a:endParaRPr lang="en-US" dirty="0"/>
+          </a:p>
+          <a:p>
+            <a:pPr marL="0" indent="0">
+              <a:buNone/>
+            </a:pPr>
+            <a:r>
+              <a:rPr lang="en-US" dirty="0">
+                <a:latin typeface="Lucida Console" panose="020B0609040504020204" pitchFamily="49" charset="0"/>
+              </a:rPr>
+              <a:t> </a:t>
+            </a:r>
+            <a:r>
+              <a:rPr lang="en-US" dirty="0" err="1">
+                <a:latin typeface="Lucida Console" panose="020B0609040504020204" pitchFamily="49" charset="0"/>
+              </a:rPr>
+              <a:t>sname</a:t>
+            </a:r>
+            <a:r>
+              <a:rPr lang="en-US" dirty="0">
+                <a:latin typeface="Lucida Console" panose="020B0609040504020204" pitchFamily="49" charset="0"/>
+              </a:rPr>
+              <a:t>      | </a:t>
+            </a:r>
+            <a:r>
+              <a:rPr lang="en-US" dirty="0" err="1">
+                <a:latin typeface="Lucida Console" panose="020B0609040504020204" pitchFamily="49" charset="0"/>
+              </a:rPr>
+              <a:t>gpa</a:t>
+            </a:r>
+            <a:endParaRPr lang="en-US" dirty="0">
+              <a:latin typeface="Lucida Console" panose="020B0609040504020204" pitchFamily="49" charset="0"/>
+            </a:endParaRPr>
+          </a:p>
+          <a:p>
+            <a:pPr marL="0" indent="0">
+              <a:buNone/>
+            </a:pPr>
+            <a:r>
+              <a:rPr lang="en-US" dirty="0">
+                <a:latin typeface="Lucida Console" panose="020B0609040504020204" pitchFamily="49" charset="0"/>
+              </a:rPr>
+              <a:t>----------------+-----</a:t>
+            </a:r>
+          </a:p>
+          <a:p>
+            <a:pPr marL="0" indent="0">
+              <a:buNone/>
+            </a:pPr>
+            <a:r>
+              <a:rPr lang="en-US" dirty="0">
+                <a:latin typeface="Lucida Console" panose="020B0609040504020204" pitchFamily="49" charset="0"/>
+              </a:rPr>
+              <a:t> </a:t>
+            </a:r>
+            <a:r>
+              <a:rPr lang="en-US" dirty="0" err="1">
+                <a:latin typeface="Lucida Console" panose="020B0609040504020204" pitchFamily="49" charset="0"/>
+              </a:rPr>
+              <a:t>Vasya</a:t>
+            </a:r>
+            <a:r>
+              <a:rPr lang="en-US" dirty="0">
+                <a:latin typeface="Lucida Console" panose="020B0609040504020204" pitchFamily="49" charset="0"/>
+              </a:rPr>
+              <a:t> </a:t>
+            </a:r>
+            <a:r>
+              <a:rPr lang="en-US" dirty="0" err="1">
+                <a:latin typeface="Lucida Console" panose="020B0609040504020204" pitchFamily="49" charset="0"/>
+              </a:rPr>
+              <a:t>Sidorov</a:t>
+            </a:r>
+            <a:r>
+              <a:rPr lang="en-US" dirty="0">
+                <a:latin typeface="Lucida Console" panose="020B0609040504020204" pitchFamily="49" charset="0"/>
+              </a:rPr>
+              <a:t>  |   5</a:t>
+            </a:r>
+          </a:p>
+          <a:p>
+            <a:pPr marL="0" indent="0">
+              <a:buNone/>
+            </a:pPr>
+            <a:r>
+              <a:rPr lang="en-US" dirty="0">
+                <a:latin typeface="Lucida Console" panose="020B0609040504020204" pitchFamily="49" charset="0"/>
+              </a:rPr>
+              <a:t> Al-</a:t>
+            </a:r>
+            <a:r>
+              <a:rPr lang="en-US" dirty="0" err="1">
+                <a:latin typeface="Lucida Console" panose="020B0609040504020204" pitchFamily="49" charset="0"/>
+              </a:rPr>
+              <a:t>Horezmi</a:t>
+            </a:r>
+            <a:r>
+              <a:rPr lang="en-US" dirty="0">
+                <a:latin typeface="Lucida Console" panose="020B0609040504020204" pitchFamily="49" charset="0"/>
+              </a:rPr>
+              <a:t>     |   5</a:t>
+            </a:r>
+          </a:p>
+          <a:p>
+            <a:pPr marL="0" indent="0">
+              <a:buNone/>
+            </a:pPr>
+            <a:r>
+              <a:rPr lang="en-US" dirty="0">
+                <a:latin typeface="Lucida Console" panose="020B0609040504020204" pitchFamily="49" charset="0"/>
+              </a:rPr>
+              <a:t> Vladimir Lenin |   5</a:t>
+            </a:r>
+          </a:p>
+          <a:p>
+            <a:pPr marL="0" indent="0">
+              <a:buNone/>
+            </a:pPr>
+            <a:r>
+              <a:rPr lang="en-US" dirty="0">
+                <a:latin typeface="Lucida Console" panose="020B0609040504020204" pitchFamily="49" charset="0"/>
+              </a:rPr>
+              <a:t> Nikola Tesla   |   5</a:t>
+            </a:r>
+          </a:p>
+          <a:p>
+            <a:pPr marL="0" indent="0">
+              <a:buNone/>
+            </a:pPr>
+            <a:endParaRPr lang="en-US" dirty="0"/>
+          </a:p>
+        </p:txBody>
+      </p:sp>
+    </p:spTree>
+    <p:extLst>
+      <p:ext uri="{BB962C8B-B14F-4D97-AF65-F5344CB8AC3E}">
+        <p14:creationId xmlns:p14="http://schemas.microsoft.com/office/powerpoint/2010/main" val="956270982"/>
+      </p:ext>
+    </p:extLst>
+  </p:cSld>
+  <p:clrMapOvr>
+    <a:masterClrMapping/>
+  </p:clrMapOvr>
+  <p:timing>
+    <p:tnLst>
+      <p:par>
+        <p:cTn id="1" dur="indefinite" restart="never" nodeType="tmRoot"/>
+      </p:par>
+    </p:tnLst>
+  </p:timing>
+</p:sld>
+</file>
+
+<file path=ppt/slides/slide24.xml><?xml version="1.0" encoding="utf-8"?>
+<p:sld xmlns:a="http://schemas.openxmlformats.org/drawingml/2006/main" xmlns:r="http://schemas.openxmlformats.org/officeDocument/2006/relationships" xmlns:p="http://schemas.openxmlformats.org/presentationml/2006/main">
+  <p:cSld>
+    <p:spTree>
+      <p:nvGrpSpPr>
+        <p:cNvPr id="1" name=""/>
+        <p:cNvGrpSpPr/>
+        <p:nvPr/>
+      </p:nvGrpSpPr>
+      <p:grpSpPr>
+        <a:xfrm>
+          <a:off x="0" y="0"/>
+          <a:ext cx="0" cy="0"/>
+          <a:chOff x="0" y="0"/>
+          <a:chExt cx="0" cy="0"/>
+        </a:xfrm>
+      </p:grpSpPr>
+      <p:sp>
+        <p:nvSpPr>
+          <p:cNvPr id="2" name="Title 1"/>
+          <p:cNvSpPr>
+            <a:spLocks noGrp="1"/>
+          </p:cNvSpPr>
+          <p:nvPr>
+            <p:ph type="title"/>
+          </p:nvPr>
+        </p:nvSpPr>
+        <p:spPr/>
+        <p:txBody>
+          <a:bodyPr/>
+          <a:lstStyle/>
+          <a:p>
+            <a:r>
+              <a:rPr lang="en-US" dirty="0" smtClean="0"/>
+              <a:t>Select </a:t>
+            </a:r>
+            <a:r>
+              <a:rPr lang="en-US" dirty="0" err="1" smtClean="0"/>
+              <a:t>subquery</a:t>
+            </a:r>
+            <a:r>
+              <a:rPr lang="en-US" dirty="0"/>
+              <a:t/>
+            </a:r>
+            <a:br>
+              <a:rPr lang="en-US" dirty="0"/>
+            </a:br>
+            <a:r>
+              <a:rPr lang="en-US" dirty="0" smtClean="0"/>
+              <a:t>EXISTS</a:t>
+            </a:r>
+            <a:endParaRPr lang="en-US" dirty="0"/>
+          </a:p>
+        </p:txBody>
+      </p:sp>
+      <p:sp>
+        <p:nvSpPr>
+          <p:cNvPr id="3" name="Content Placeholder 2"/>
+          <p:cNvSpPr>
+            <a:spLocks noGrp="1"/>
+          </p:cNvSpPr>
+          <p:nvPr>
+            <p:ph idx="1"/>
+          </p:nvPr>
+        </p:nvSpPr>
+        <p:spPr/>
+        <p:txBody>
+          <a:bodyPr/>
+          <a:lstStyle/>
+          <a:p>
+            <a:pPr marL="0" indent="0">
+              <a:buNone/>
+            </a:pPr>
+            <a:r>
+              <a:rPr lang="en-US" dirty="0" smtClean="0"/>
+              <a:t>	</a:t>
+            </a:r>
+            <a:r>
+              <a:rPr lang="ru-RU" dirty="0" smtClean="0"/>
+              <a:t>Без подзапроса </a:t>
+            </a:r>
+            <a:r>
+              <a:rPr lang="en-US" dirty="0" smtClean="0"/>
+              <a:t>exists:</a:t>
+            </a:r>
+          </a:p>
+          <a:p>
+            <a:pPr marL="0" indent="0">
+              <a:buNone/>
+            </a:pPr>
+            <a:endParaRPr lang="en-US" dirty="0" smtClean="0"/>
+          </a:p>
+          <a:p>
+            <a:pPr marL="0" indent="0">
+              <a:buNone/>
+            </a:pPr>
+            <a:r>
+              <a:rPr lang="en-US" dirty="0" smtClean="0"/>
+              <a:t>	Select S1.sName,S1.GPA</a:t>
+            </a:r>
+          </a:p>
+          <a:p>
+            <a:pPr marL="0" indent="0">
+              <a:buNone/>
+            </a:pPr>
+            <a:r>
+              <a:rPr lang="en-US" dirty="0"/>
+              <a:t>	</a:t>
+            </a:r>
+            <a:r>
+              <a:rPr lang="en-US" dirty="0" smtClean="0"/>
+              <a:t>from Student S1, Student S2</a:t>
+            </a:r>
+          </a:p>
+          <a:p>
+            <a:pPr marL="0" indent="0">
+              <a:buNone/>
+            </a:pPr>
+            <a:r>
+              <a:rPr lang="en-US" dirty="0" smtClean="0"/>
+              <a:t>	where S2.GPA &gt; S1.GPA</a:t>
+            </a:r>
+            <a:endParaRPr lang="en-US" dirty="0"/>
+          </a:p>
+        </p:txBody>
+      </p:sp>
+    </p:spTree>
+    <p:extLst>
+      <p:ext uri="{BB962C8B-B14F-4D97-AF65-F5344CB8AC3E}">
+        <p14:creationId xmlns:p14="http://schemas.microsoft.com/office/powerpoint/2010/main" val="3150717242"/>
+      </p:ext>
+    </p:extLst>
+  </p:cSld>
+  <p:clrMapOvr>
+    <a:masterClrMapping/>
+  </p:clrMapOvr>
+  <p:timing>
+    <p:tnLst>
+      <p:par>
+        <p:cTn id="1" dur="indefinite" restart="never" nodeType="tmRoot"/>
+      </p:par>
+    </p:tnLst>
+  </p:timing>
+</p:sld>
+</file>
+
+<file path=ppt/slides/slide25.xml><?xml version="1.0" encoding="utf-8"?>
+<p:sld xmlns:a="http://schemas.openxmlformats.org/drawingml/2006/main" xmlns:r="http://schemas.openxmlformats.org/officeDocument/2006/relationships" xmlns:p="http://schemas.openxmlformats.org/presentationml/2006/main">
+  <p:cSld>
+    <p:spTree>
+      <p:nvGrpSpPr>
+        <p:cNvPr id="1" name=""/>
+        <p:cNvGrpSpPr/>
+        <p:nvPr/>
+      </p:nvGrpSpPr>
+      <p:grpSpPr>
+        <a:xfrm>
+          <a:off x="0" y="0"/>
+          <a:ext cx="0" cy="0"/>
+          <a:chOff x="0" y="0"/>
+          <a:chExt cx="0" cy="0"/>
+        </a:xfrm>
+      </p:grpSpPr>
+      <p:sp>
+        <p:nvSpPr>
+          <p:cNvPr id="2" name="Title 1"/>
+          <p:cNvSpPr>
+            <a:spLocks noGrp="1"/>
+          </p:cNvSpPr>
+          <p:nvPr>
+            <p:ph type="title"/>
+          </p:nvPr>
+        </p:nvSpPr>
+        <p:spPr/>
+        <p:txBody>
+          <a:bodyPr/>
+          <a:lstStyle/>
+          <a:p>
+            <a:r>
+              <a:rPr lang="en-US" dirty="0" smtClean="0"/>
+              <a:t>Select </a:t>
+            </a:r>
+            <a:r>
+              <a:rPr lang="en-US" dirty="0" err="1" smtClean="0"/>
+              <a:t>subquery</a:t>
+            </a:r>
+            <a:r>
+              <a:rPr lang="en-US" dirty="0"/>
+              <a:t/>
+            </a:r>
+            <a:br>
+              <a:rPr lang="en-US" dirty="0"/>
+            </a:br>
+            <a:r>
+              <a:rPr lang="en-US" dirty="0" smtClean="0"/>
+              <a:t>EXISTS</a:t>
+            </a:r>
+            <a:endParaRPr lang="en-US" dirty="0"/>
+          </a:p>
+        </p:txBody>
+      </p:sp>
+      <p:sp>
+        <p:nvSpPr>
+          <p:cNvPr id="3" name="Content Placeholder 2"/>
+          <p:cNvSpPr>
+            <a:spLocks noGrp="1"/>
+          </p:cNvSpPr>
+          <p:nvPr>
+            <p:ph idx="1"/>
+          </p:nvPr>
+        </p:nvSpPr>
+        <p:spPr/>
+        <p:txBody>
+          <a:bodyPr/>
+          <a:lstStyle/>
+          <a:p>
+            <a:pPr marL="0" indent="0">
+              <a:buNone/>
+            </a:pPr>
+            <a:r>
+              <a:rPr lang="en-US" dirty="0" smtClean="0"/>
+              <a:t>	</a:t>
+            </a:r>
+            <a:r>
+              <a:rPr lang="ru-RU" dirty="0" smtClean="0"/>
+              <a:t>Без подзапроса </a:t>
+            </a:r>
+            <a:r>
+              <a:rPr lang="en-US" dirty="0" smtClean="0"/>
+              <a:t>exists:</a:t>
+            </a:r>
+          </a:p>
+          <a:p>
+            <a:pPr marL="0" indent="0">
+              <a:buNone/>
+            </a:pPr>
+            <a:endParaRPr lang="en-US" dirty="0" smtClean="0"/>
+          </a:p>
+          <a:p>
+            <a:pPr marL="0" indent="0">
+              <a:buNone/>
+            </a:pPr>
+            <a:r>
+              <a:rPr lang="en-US" dirty="0" smtClean="0"/>
+              <a:t>	Select S1.sName,S1.GPA</a:t>
+            </a:r>
+          </a:p>
+          <a:p>
+            <a:pPr marL="0" indent="0">
+              <a:buNone/>
+            </a:pPr>
+            <a:r>
+              <a:rPr lang="en-US" dirty="0"/>
+              <a:t>	</a:t>
+            </a:r>
+            <a:r>
+              <a:rPr lang="en-US" dirty="0" smtClean="0"/>
+              <a:t>from Student S1, Student S2</a:t>
+            </a:r>
+          </a:p>
+          <a:p>
+            <a:pPr marL="0" indent="0">
+              <a:buNone/>
+            </a:pPr>
+            <a:r>
+              <a:rPr lang="en-US" dirty="0" smtClean="0"/>
+              <a:t>	where S2.GPA &gt; S1.GPA</a:t>
+            </a:r>
+            <a:endParaRPr lang="en-US" dirty="0"/>
+          </a:p>
+        </p:txBody>
+      </p:sp>
+      <p:cxnSp>
+        <p:nvCxnSpPr>
+          <p:cNvPr id="5" name="Straight Connector 4"/>
+          <p:cNvCxnSpPr/>
+          <p:nvPr/>
+        </p:nvCxnSpPr>
+        <p:spPr>
+          <a:xfrm>
+            <a:off x="914400" y="2830881"/>
+            <a:ext cx="3645074" cy="2834640"/>
+          </a:xfrm>
+          <a:prstGeom prst="line">
+            <a:avLst/>
+          </a:prstGeom>
+        </p:spPr>
+        <p:style>
+          <a:lnRef idx="1">
+            <a:schemeClr val="accent1"/>
+          </a:lnRef>
+          <a:fillRef idx="0">
+            <a:schemeClr val="accent1"/>
+          </a:fillRef>
+          <a:effectRef idx="0">
+            <a:schemeClr val="accent1"/>
+          </a:effectRef>
+          <a:fontRef idx="minor">
+            <a:schemeClr val="tx1"/>
+          </a:fontRef>
+        </p:style>
+      </p:cxnSp>
+      <p:cxnSp>
+        <p:nvCxnSpPr>
+          <p:cNvPr id="6" name="Straight Connector 5"/>
+          <p:cNvCxnSpPr/>
+          <p:nvPr/>
+        </p:nvCxnSpPr>
+        <p:spPr>
+          <a:xfrm flipV="1">
+            <a:off x="914400" y="2830881"/>
+            <a:ext cx="3519814" cy="2987041"/>
+          </a:xfrm>
+          <a:prstGeom prst="line">
+            <a:avLst/>
+          </a:prstGeom>
+        </p:spPr>
+        <p:style>
+          <a:lnRef idx="1">
+            <a:schemeClr val="accent1"/>
+          </a:lnRef>
+          <a:fillRef idx="0">
+            <a:schemeClr val="accent1"/>
+          </a:fillRef>
+          <a:effectRef idx="0">
+            <a:schemeClr val="accent1"/>
+          </a:effectRef>
+          <a:fontRef idx="minor">
+            <a:schemeClr val="tx1"/>
+          </a:fontRef>
+        </p:style>
+      </p:cxnSp>
+    </p:spTree>
+    <p:extLst>
+      <p:ext uri="{BB962C8B-B14F-4D97-AF65-F5344CB8AC3E}">
+        <p14:creationId xmlns:p14="http://schemas.microsoft.com/office/powerpoint/2010/main" val="4141854734"/>
+      </p:ext>
+    </p:extLst>
+  </p:cSld>
+  <p:clrMapOvr>
+    <a:masterClrMapping/>
+  </p:clrMapOvr>
+  <p:timing>
+    <p:tnLst>
+      <p:par>
+        <p:cTn id="1" dur="indefinite" restart="never" nodeType="tmRoot"/>
+      </p:par>
+    </p:tnLst>
+  </p:timing>
+</p:sld>
+</file>
+
+<file path=ppt/slides/slide26.xml><?xml version="1.0" encoding="utf-8"?>
+<p:sld xmlns:a="http://schemas.openxmlformats.org/drawingml/2006/main" xmlns:r="http://schemas.openxmlformats.org/officeDocument/2006/relationships" xmlns:p="http://schemas.openxmlformats.org/presentationml/2006/main">
+  <p:cSld>
+    <p:spTree>
+      <p:nvGrpSpPr>
+        <p:cNvPr id="1" name=""/>
+        <p:cNvGrpSpPr/>
+        <p:nvPr/>
+      </p:nvGrpSpPr>
+      <p:grpSpPr>
+        <a:xfrm>
+          <a:off x="0" y="0"/>
+          <a:ext cx="0" cy="0"/>
+          <a:chOff x="0" y="0"/>
+          <a:chExt cx="0" cy="0"/>
+        </a:xfrm>
+      </p:grpSpPr>
+      <p:sp>
+        <p:nvSpPr>
+          <p:cNvPr id="2" name="Title 1"/>
+          <p:cNvSpPr>
+            <a:spLocks noGrp="1"/>
+          </p:cNvSpPr>
+          <p:nvPr>
+            <p:ph type="title"/>
+          </p:nvPr>
+        </p:nvSpPr>
+        <p:spPr/>
+        <p:txBody>
+          <a:bodyPr/>
+          <a:lstStyle/>
+          <a:p>
+            <a:r>
+              <a:rPr lang="en-US" dirty="0" smtClean="0"/>
+              <a:t>Select </a:t>
+            </a:r>
+            <a:r>
+              <a:rPr lang="en-US" dirty="0" err="1" smtClean="0"/>
+              <a:t>subquery</a:t>
+            </a:r>
+            <a:r>
+              <a:rPr lang="en-US" dirty="0"/>
+              <a:t/>
+            </a:r>
+            <a:br>
+              <a:rPr lang="en-US" dirty="0"/>
+            </a:br>
+            <a:r>
+              <a:rPr lang="en-US" dirty="0" smtClean="0"/>
+              <a:t>ALL</a:t>
+            </a:r>
+            <a:endParaRPr lang="en-US" dirty="0"/>
+          </a:p>
+        </p:txBody>
+      </p:sp>
+      <p:sp>
+        <p:nvSpPr>
+          <p:cNvPr id="3" name="Content Placeholder 2"/>
+          <p:cNvSpPr>
+            <a:spLocks noGrp="1"/>
+          </p:cNvSpPr>
+          <p:nvPr>
+            <p:ph idx="1"/>
+          </p:nvPr>
+        </p:nvSpPr>
+        <p:spPr/>
+        <p:txBody>
+          <a:bodyPr/>
+          <a:lstStyle/>
+          <a:p>
+            <a:pPr marL="0" indent="0">
+              <a:buNone/>
+            </a:pPr>
+            <a:r>
+              <a:rPr lang="en-US" dirty="0" smtClean="0"/>
+              <a:t>	</a:t>
+            </a:r>
+            <a:r>
+              <a:rPr lang="en-US" dirty="0" smtClean="0"/>
+              <a:t>Select </a:t>
+            </a:r>
+            <a:r>
+              <a:rPr lang="en-US" dirty="0" err="1" smtClean="0"/>
+              <a:t>sName,GPA</a:t>
+            </a:r>
+            <a:endParaRPr lang="en-US" dirty="0" smtClean="0"/>
+          </a:p>
+          <a:p>
+            <a:pPr marL="0" indent="0">
+              <a:buNone/>
+            </a:pPr>
+            <a:r>
+              <a:rPr lang="en-US" dirty="0"/>
+              <a:t>	</a:t>
+            </a:r>
+            <a:r>
+              <a:rPr lang="en-US" dirty="0" smtClean="0"/>
+              <a:t>from Student</a:t>
+            </a:r>
+          </a:p>
+          <a:p>
+            <a:pPr marL="0" indent="0">
+              <a:buNone/>
+            </a:pPr>
+            <a:r>
+              <a:rPr lang="en-US" dirty="0" smtClean="0"/>
+              <a:t>	where GPA &gt;= </a:t>
+            </a:r>
+            <a:r>
+              <a:rPr lang="en-US" dirty="0" smtClean="0">
+                <a:solidFill>
+                  <a:srgbClr val="FF0000"/>
+                </a:solidFill>
+              </a:rPr>
+              <a:t>all </a:t>
+            </a:r>
+            <a:r>
+              <a:rPr lang="en-US" dirty="0" smtClean="0"/>
+              <a:t>(Select GPA from Student)</a:t>
+            </a:r>
+          </a:p>
+          <a:p>
+            <a:pPr marL="0" indent="0">
+              <a:buNone/>
+            </a:pPr>
+            <a:endParaRPr lang="en-US" dirty="0" smtClean="0"/>
+          </a:p>
+          <a:p>
+            <a:pPr marL="0" indent="0">
+              <a:buNone/>
+            </a:pPr>
+            <a:r>
+              <a:rPr lang="en-US" dirty="0">
+                <a:latin typeface="Lucida Console" panose="020B0609040504020204" pitchFamily="49" charset="0"/>
+              </a:rPr>
+              <a:t> </a:t>
+            </a:r>
+            <a:r>
+              <a:rPr lang="en-US" dirty="0" err="1">
+                <a:latin typeface="Lucida Console" panose="020B0609040504020204" pitchFamily="49" charset="0"/>
+              </a:rPr>
+              <a:t>sname</a:t>
+            </a:r>
+            <a:r>
+              <a:rPr lang="en-US" dirty="0">
+                <a:latin typeface="Lucida Console" panose="020B0609040504020204" pitchFamily="49" charset="0"/>
+              </a:rPr>
+              <a:t>      | </a:t>
+            </a:r>
+            <a:r>
+              <a:rPr lang="en-US" dirty="0" err="1">
+                <a:latin typeface="Lucida Console" panose="020B0609040504020204" pitchFamily="49" charset="0"/>
+              </a:rPr>
+              <a:t>gpa</a:t>
+            </a:r>
+            <a:endParaRPr lang="en-US" dirty="0">
+              <a:latin typeface="Lucida Console" panose="020B0609040504020204" pitchFamily="49" charset="0"/>
+            </a:endParaRPr>
+          </a:p>
+          <a:p>
+            <a:pPr marL="0" indent="0">
+              <a:buNone/>
+            </a:pPr>
+            <a:r>
+              <a:rPr lang="en-US" dirty="0">
+                <a:latin typeface="Lucida Console" panose="020B0609040504020204" pitchFamily="49" charset="0"/>
+              </a:rPr>
+              <a:t>----------------+-----</a:t>
+            </a:r>
+          </a:p>
+          <a:p>
+            <a:pPr marL="0" indent="0">
+              <a:buNone/>
+            </a:pPr>
+            <a:r>
+              <a:rPr lang="en-US" dirty="0">
+                <a:latin typeface="Lucida Console" panose="020B0609040504020204" pitchFamily="49" charset="0"/>
+              </a:rPr>
+              <a:t> </a:t>
+            </a:r>
+            <a:r>
+              <a:rPr lang="en-US" dirty="0" err="1">
+                <a:latin typeface="Lucida Console" panose="020B0609040504020204" pitchFamily="49" charset="0"/>
+              </a:rPr>
+              <a:t>Vasya</a:t>
+            </a:r>
+            <a:r>
+              <a:rPr lang="en-US" dirty="0">
+                <a:latin typeface="Lucida Console" panose="020B0609040504020204" pitchFamily="49" charset="0"/>
+              </a:rPr>
+              <a:t> </a:t>
+            </a:r>
+            <a:r>
+              <a:rPr lang="en-US" dirty="0" err="1">
+                <a:latin typeface="Lucida Console" panose="020B0609040504020204" pitchFamily="49" charset="0"/>
+              </a:rPr>
+              <a:t>Sidorov</a:t>
+            </a:r>
+            <a:r>
+              <a:rPr lang="en-US" dirty="0">
+                <a:latin typeface="Lucida Console" panose="020B0609040504020204" pitchFamily="49" charset="0"/>
+              </a:rPr>
+              <a:t>  |   5</a:t>
+            </a:r>
+          </a:p>
+          <a:p>
+            <a:pPr marL="0" indent="0">
+              <a:buNone/>
+            </a:pPr>
+            <a:r>
+              <a:rPr lang="en-US" dirty="0">
+                <a:latin typeface="Lucida Console" panose="020B0609040504020204" pitchFamily="49" charset="0"/>
+              </a:rPr>
+              <a:t> Al-</a:t>
+            </a:r>
+            <a:r>
+              <a:rPr lang="en-US" dirty="0" err="1">
+                <a:latin typeface="Lucida Console" panose="020B0609040504020204" pitchFamily="49" charset="0"/>
+              </a:rPr>
+              <a:t>Horezmi</a:t>
+            </a:r>
+            <a:r>
+              <a:rPr lang="en-US" dirty="0">
+                <a:latin typeface="Lucida Console" panose="020B0609040504020204" pitchFamily="49" charset="0"/>
+              </a:rPr>
+              <a:t>     |   5</a:t>
+            </a:r>
+          </a:p>
+          <a:p>
+            <a:pPr marL="0" indent="0">
+              <a:buNone/>
+            </a:pPr>
+            <a:r>
+              <a:rPr lang="en-US" dirty="0">
+                <a:latin typeface="Lucida Console" panose="020B0609040504020204" pitchFamily="49" charset="0"/>
+              </a:rPr>
+              <a:t> Vladimir Lenin |   5</a:t>
+            </a:r>
+          </a:p>
+          <a:p>
+            <a:pPr marL="0" indent="0">
+              <a:buNone/>
+            </a:pPr>
+            <a:r>
+              <a:rPr lang="en-US" dirty="0">
+                <a:latin typeface="Lucida Console" panose="020B0609040504020204" pitchFamily="49" charset="0"/>
+              </a:rPr>
+              <a:t> Nikola Tesla   |   5</a:t>
+            </a:r>
+            <a:endParaRPr lang="en-US" dirty="0">
+              <a:latin typeface="Lucida Console" panose="020B0609040504020204" pitchFamily="49" charset="0"/>
+            </a:endParaRPr>
+          </a:p>
+        </p:txBody>
+      </p:sp>
+    </p:spTree>
+    <p:extLst>
+      <p:ext uri="{BB962C8B-B14F-4D97-AF65-F5344CB8AC3E}">
+        <p14:creationId xmlns:p14="http://schemas.microsoft.com/office/powerpoint/2010/main" val="758447187"/>
+      </p:ext>
+    </p:extLst>
+  </p:cSld>
+  <p:clrMapOvr>
+    <a:masterClrMapping/>
+  </p:clrMapOvr>
+  <p:timing>
+    <p:tnLst>
+      <p:par>
+        <p:cTn id="1" dur="indefinite" restart="never" nodeType="tmRoot"/>
+      </p:par>
+    </p:tnLst>
+  </p:timing>
+</p:sld>
+</file>
+
+<file path=ppt/slides/slide27.xml><?xml version="1.0" encoding="utf-8"?>
+<p:sld xmlns:a="http://schemas.openxmlformats.org/drawingml/2006/main" xmlns:r="http://schemas.openxmlformats.org/officeDocument/2006/relationships" xmlns:p="http://schemas.openxmlformats.org/presentationml/2006/main">
+  <p:cSld>
+    <p:spTree>
+      <p:nvGrpSpPr>
+        <p:cNvPr id="1" name=""/>
+        <p:cNvGrpSpPr/>
+        <p:nvPr/>
+      </p:nvGrpSpPr>
+      <p:grpSpPr>
+        <a:xfrm>
+          <a:off x="0" y="0"/>
+          <a:ext cx="0" cy="0"/>
+          <a:chOff x="0" y="0"/>
+          <a:chExt cx="0" cy="0"/>
+        </a:xfrm>
+      </p:grpSpPr>
+      <p:sp>
+        <p:nvSpPr>
+          <p:cNvPr id="2" name="Title 1"/>
+          <p:cNvSpPr>
+            <a:spLocks noGrp="1"/>
+          </p:cNvSpPr>
+          <p:nvPr>
+            <p:ph type="title"/>
+          </p:nvPr>
+        </p:nvSpPr>
+        <p:spPr/>
+        <p:txBody>
+          <a:bodyPr/>
+          <a:lstStyle/>
+          <a:p>
+            <a:r>
+              <a:rPr lang="en-US" dirty="0" smtClean="0"/>
+              <a:t>Select </a:t>
+            </a:r>
+            <a:r>
+              <a:rPr lang="en-US" dirty="0" err="1" smtClean="0"/>
+              <a:t>subquery</a:t>
+            </a:r>
+            <a:r>
+              <a:rPr lang="en-US" dirty="0"/>
+              <a:t/>
+            </a:r>
+            <a:br>
+              <a:rPr lang="en-US" dirty="0"/>
+            </a:br>
+            <a:r>
+              <a:rPr lang="en-US" dirty="0" smtClean="0"/>
+              <a:t>ANY</a:t>
+            </a:r>
+            <a:endParaRPr lang="en-US" dirty="0"/>
+          </a:p>
+        </p:txBody>
+      </p:sp>
+      <p:sp>
+        <p:nvSpPr>
+          <p:cNvPr id="3" name="Content Placeholder 2"/>
+          <p:cNvSpPr>
+            <a:spLocks noGrp="1"/>
+          </p:cNvSpPr>
+          <p:nvPr>
+            <p:ph idx="1"/>
+          </p:nvPr>
+        </p:nvSpPr>
+        <p:spPr/>
+        <p:txBody>
+          <a:bodyPr/>
+          <a:lstStyle/>
+          <a:p>
+            <a:pPr marL="0" indent="0">
+              <a:buNone/>
+            </a:pPr>
+            <a:r>
+              <a:rPr lang="en-US" dirty="0" smtClean="0"/>
+              <a:t>	</a:t>
+            </a:r>
+            <a:r>
+              <a:rPr lang="en-US" dirty="0" smtClean="0"/>
+              <a:t>Select </a:t>
+            </a:r>
+            <a:r>
+              <a:rPr lang="en-US" dirty="0" err="1" smtClean="0"/>
+              <a:t>sName,GPA</a:t>
+            </a:r>
+            <a:endParaRPr lang="en-US" dirty="0" smtClean="0"/>
+          </a:p>
+          <a:p>
+            <a:pPr marL="0" indent="0">
+              <a:buNone/>
+            </a:pPr>
+            <a:r>
+              <a:rPr lang="en-US" dirty="0"/>
+              <a:t>	</a:t>
+            </a:r>
+            <a:r>
+              <a:rPr lang="en-US" dirty="0" smtClean="0"/>
+              <a:t>from Student</a:t>
+            </a:r>
+          </a:p>
+          <a:p>
+            <a:pPr marL="0" indent="0">
+              <a:buNone/>
+            </a:pPr>
+            <a:r>
+              <a:rPr lang="en-US" dirty="0" smtClean="0"/>
+              <a:t>	where not GPA &lt; </a:t>
+            </a:r>
+            <a:r>
+              <a:rPr lang="en-US" dirty="0" smtClean="0">
+                <a:solidFill>
+                  <a:srgbClr val="FF0000"/>
+                </a:solidFill>
+              </a:rPr>
+              <a:t>any</a:t>
+            </a:r>
+            <a:r>
+              <a:rPr lang="en-US" dirty="0" smtClean="0"/>
+              <a:t> (Select GPA from Student)</a:t>
+            </a:r>
+          </a:p>
+          <a:p>
+            <a:pPr marL="0" indent="0">
+              <a:buNone/>
+            </a:pPr>
+            <a:endParaRPr lang="en-US" dirty="0" smtClean="0"/>
+          </a:p>
+          <a:p>
+            <a:pPr marL="0" indent="0">
+              <a:buNone/>
+            </a:pPr>
+            <a:r>
+              <a:rPr lang="en-US" dirty="0">
+                <a:latin typeface="Lucida Console" panose="020B0609040504020204" pitchFamily="49" charset="0"/>
+              </a:rPr>
+              <a:t> </a:t>
+            </a:r>
+            <a:r>
+              <a:rPr lang="en-US" dirty="0" err="1">
+                <a:latin typeface="Lucida Console" panose="020B0609040504020204" pitchFamily="49" charset="0"/>
+              </a:rPr>
+              <a:t>sname</a:t>
+            </a:r>
+            <a:r>
+              <a:rPr lang="en-US" dirty="0">
+                <a:latin typeface="Lucida Console" panose="020B0609040504020204" pitchFamily="49" charset="0"/>
+              </a:rPr>
+              <a:t>      | </a:t>
+            </a:r>
+            <a:r>
+              <a:rPr lang="en-US" dirty="0" err="1">
+                <a:latin typeface="Lucida Console" panose="020B0609040504020204" pitchFamily="49" charset="0"/>
+              </a:rPr>
+              <a:t>gpa</a:t>
+            </a:r>
+            <a:endParaRPr lang="en-US" dirty="0">
+              <a:latin typeface="Lucida Console" panose="020B0609040504020204" pitchFamily="49" charset="0"/>
+            </a:endParaRPr>
+          </a:p>
+          <a:p>
+            <a:pPr marL="0" indent="0">
+              <a:buNone/>
+            </a:pPr>
+            <a:r>
+              <a:rPr lang="en-US" dirty="0">
+                <a:latin typeface="Lucida Console" panose="020B0609040504020204" pitchFamily="49" charset="0"/>
+              </a:rPr>
+              <a:t>----------------+-----</a:t>
+            </a:r>
+          </a:p>
+          <a:p>
+            <a:pPr marL="0" indent="0">
+              <a:buNone/>
+            </a:pPr>
+            <a:r>
+              <a:rPr lang="en-US" dirty="0">
+                <a:latin typeface="Lucida Console" panose="020B0609040504020204" pitchFamily="49" charset="0"/>
+              </a:rPr>
+              <a:t> </a:t>
+            </a:r>
+            <a:r>
+              <a:rPr lang="en-US" dirty="0" err="1">
+                <a:latin typeface="Lucida Console" panose="020B0609040504020204" pitchFamily="49" charset="0"/>
+              </a:rPr>
+              <a:t>Vasya</a:t>
+            </a:r>
+            <a:r>
+              <a:rPr lang="en-US" dirty="0">
+                <a:latin typeface="Lucida Console" panose="020B0609040504020204" pitchFamily="49" charset="0"/>
+              </a:rPr>
+              <a:t> </a:t>
+            </a:r>
+            <a:r>
+              <a:rPr lang="en-US" dirty="0" err="1">
+                <a:latin typeface="Lucida Console" panose="020B0609040504020204" pitchFamily="49" charset="0"/>
+              </a:rPr>
+              <a:t>Sidorov</a:t>
+            </a:r>
+            <a:r>
+              <a:rPr lang="en-US" dirty="0">
+                <a:latin typeface="Lucida Console" panose="020B0609040504020204" pitchFamily="49" charset="0"/>
+              </a:rPr>
+              <a:t>  |   5</a:t>
+            </a:r>
+          </a:p>
+          <a:p>
+            <a:pPr marL="0" indent="0">
+              <a:buNone/>
+            </a:pPr>
+            <a:r>
+              <a:rPr lang="en-US" dirty="0">
+                <a:latin typeface="Lucida Console" panose="020B0609040504020204" pitchFamily="49" charset="0"/>
+              </a:rPr>
+              <a:t> Al-</a:t>
+            </a:r>
+            <a:r>
+              <a:rPr lang="en-US" dirty="0" err="1">
+                <a:latin typeface="Lucida Console" panose="020B0609040504020204" pitchFamily="49" charset="0"/>
+              </a:rPr>
+              <a:t>Horezmi</a:t>
+            </a:r>
+            <a:r>
+              <a:rPr lang="en-US" dirty="0">
+                <a:latin typeface="Lucida Console" panose="020B0609040504020204" pitchFamily="49" charset="0"/>
+              </a:rPr>
+              <a:t>     |   5</a:t>
+            </a:r>
+          </a:p>
+          <a:p>
+            <a:pPr marL="0" indent="0">
+              <a:buNone/>
+            </a:pPr>
+            <a:r>
+              <a:rPr lang="en-US" dirty="0">
+                <a:latin typeface="Lucida Console" panose="020B0609040504020204" pitchFamily="49" charset="0"/>
+              </a:rPr>
+              <a:t> Vladimir Lenin |   5</a:t>
+            </a:r>
+          </a:p>
+          <a:p>
+            <a:pPr marL="0" indent="0">
+              <a:buNone/>
+            </a:pPr>
+            <a:r>
+              <a:rPr lang="en-US" dirty="0">
+                <a:latin typeface="Lucida Console" panose="020B0609040504020204" pitchFamily="49" charset="0"/>
+              </a:rPr>
+              <a:t> Nikola Tesla   |   5</a:t>
+            </a:r>
+            <a:endParaRPr lang="en-US" dirty="0">
+              <a:latin typeface="Lucida Console" panose="020B0609040504020204" pitchFamily="49" charset="0"/>
+            </a:endParaRPr>
+          </a:p>
+        </p:txBody>
+      </p:sp>
+    </p:spTree>
+    <p:extLst>
+      <p:ext uri="{BB962C8B-B14F-4D97-AF65-F5344CB8AC3E}">
+        <p14:creationId xmlns:p14="http://schemas.microsoft.com/office/powerpoint/2010/main" val="1374891465"/>
+      </p:ext>
+    </p:extLst>
+  </p:cSld>
+  <p:clrMapOvr>
+    <a:masterClrMapping/>
+  </p:clrMapOvr>
+  <p:timing>
+    <p:tnLst>
+      <p:par>
+        <p:cTn id="1" dur="indefinite" restart="never" nodeType="tmRoot"/>
+      </p:par>
+    </p:tnLst>
+  </p:timing>
+</p:sld>
+</file>
+
+<file path=ppt/slides/slide28.xml><?xml version="1.0" encoding="utf-8"?>
+<p:sld xmlns:a="http://schemas.openxmlformats.org/drawingml/2006/main" xmlns:r="http://schemas.openxmlformats.org/officeDocument/2006/relationships" xmlns:p="http://schemas.openxmlformats.org/presentationml/2006/main">
+  <p:cSld>
+    <p:spTree>
+      <p:nvGrpSpPr>
+        <p:cNvPr id="1" name=""/>
+        <p:cNvGrpSpPr/>
+        <p:nvPr/>
+      </p:nvGrpSpPr>
+      <p:grpSpPr>
+        <a:xfrm>
+          <a:off x="0" y="0"/>
+          <a:ext cx="0" cy="0"/>
+          <a:chOff x="0" y="0"/>
+          <a:chExt cx="0" cy="0"/>
+        </a:xfrm>
+      </p:grpSpPr>
+      <p:sp>
+        <p:nvSpPr>
+          <p:cNvPr id="2" name="Title 1"/>
+          <p:cNvSpPr>
+            <a:spLocks noGrp="1"/>
+          </p:cNvSpPr>
+          <p:nvPr>
+            <p:ph type="title"/>
+          </p:nvPr>
+        </p:nvSpPr>
+        <p:spPr/>
+        <p:txBody>
+          <a:bodyPr/>
+          <a:lstStyle/>
+          <a:p>
+            <a:r>
+              <a:rPr lang="en-US" dirty="0" smtClean="0"/>
+              <a:t>Select </a:t>
+            </a:r>
+            <a:r>
+              <a:rPr lang="en-US" dirty="0" err="1" smtClean="0"/>
+              <a:t>subquery</a:t>
+            </a:r>
+            <a:r>
+              <a:rPr lang="en-US" dirty="0"/>
+              <a:t/>
+            </a:r>
+            <a:br>
+              <a:rPr lang="en-US" dirty="0"/>
+            </a:br>
+            <a:r>
+              <a:rPr lang="en-US" dirty="0" smtClean="0"/>
+              <a:t>ANY</a:t>
+            </a:r>
+            <a:endParaRPr lang="en-US" dirty="0"/>
+          </a:p>
+        </p:txBody>
+      </p:sp>
+      <p:sp>
+        <p:nvSpPr>
+          <p:cNvPr id="3" name="Content Placeholder 2"/>
+          <p:cNvSpPr>
+            <a:spLocks noGrp="1"/>
+          </p:cNvSpPr>
+          <p:nvPr>
+            <p:ph idx="1"/>
+          </p:nvPr>
+        </p:nvSpPr>
+        <p:spPr/>
+        <p:txBody>
+          <a:bodyPr/>
+          <a:lstStyle/>
+          <a:p>
+            <a:pPr marL="0" indent="0">
+              <a:buNone/>
+            </a:pPr>
+            <a:r>
+              <a:rPr lang="en-US" dirty="0" smtClean="0"/>
+              <a:t>	</a:t>
+            </a:r>
+            <a:r>
+              <a:rPr lang="ru-RU" dirty="0" smtClean="0"/>
+              <a:t>Вывести абитуриентов </a:t>
+            </a:r>
+            <a:r>
+              <a:rPr lang="ru-RU" dirty="0" smtClean="0"/>
+              <a:t>не из самых маленьких школ</a:t>
+            </a:r>
+            <a:endParaRPr lang="en-US" dirty="0"/>
+          </a:p>
+        </p:txBody>
+      </p:sp>
+    </p:spTree>
+    <p:extLst>
+      <p:ext uri="{BB962C8B-B14F-4D97-AF65-F5344CB8AC3E}">
+        <p14:creationId xmlns:p14="http://schemas.microsoft.com/office/powerpoint/2010/main" val="3827097315"/>
+      </p:ext>
+    </p:extLst>
+  </p:cSld>
+  <p:clrMapOvr>
+    <a:masterClrMapping/>
+  </p:clrMapOvr>
+  <p:timing>
+    <p:tnLst>
+      <p:par>
+        <p:cTn id="1" dur="indefinite" restart="never" nodeType="tmRoot"/>
+      </p:par>
+    </p:tnLst>
+  </p:timing>
+</p:sld>
+</file>
+
+<file path=ppt/slides/slide29.xml><?xml version="1.0" encoding="utf-8"?>
+<p:sld xmlns:a="http://schemas.openxmlformats.org/drawingml/2006/main" xmlns:r="http://schemas.openxmlformats.org/officeDocument/2006/relationships" xmlns:p="http://schemas.openxmlformats.org/presentationml/2006/main">
+  <p:cSld>
+    <p:spTree>
+      <p:nvGrpSpPr>
+        <p:cNvPr id="1" name=""/>
+        <p:cNvGrpSpPr/>
+        <p:nvPr/>
+      </p:nvGrpSpPr>
+      <p:grpSpPr>
+        <a:xfrm>
+          <a:off x="0" y="0"/>
+          <a:ext cx="0" cy="0"/>
+          <a:chOff x="0" y="0"/>
+          <a:chExt cx="0" cy="0"/>
+        </a:xfrm>
+      </p:grpSpPr>
+      <p:sp>
+        <p:nvSpPr>
+          <p:cNvPr id="2" name="Title 1"/>
+          <p:cNvSpPr>
+            <a:spLocks noGrp="1"/>
+          </p:cNvSpPr>
+          <p:nvPr>
+            <p:ph type="title"/>
+          </p:nvPr>
+        </p:nvSpPr>
+        <p:spPr/>
+        <p:txBody>
+          <a:bodyPr/>
+          <a:lstStyle/>
+          <a:p>
+            <a:r>
+              <a:rPr lang="en-US" dirty="0" smtClean="0"/>
+              <a:t>Select </a:t>
+            </a:r>
+            <a:r>
+              <a:rPr lang="en-US" dirty="0" err="1" smtClean="0"/>
+              <a:t>subquery</a:t>
+            </a:r>
+            <a:r>
+              <a:rPr lang="en-US" dirty="0"/>
+              <a:t/>
+            </a:r>
+            <a:br>
+              <a:rPr lang="en-US" dirty="0"/>
+            </a:br>
+            <a:r>
+              <a:rPr lang="en-US" dirty="0" smtClean="0"/>
+              <a:t>ANY</a:t>
+            </a:r>
+            <a:endParaRPr lang="en-US" dirty="0"/>
+          </a:p>
+        </p:txBody>
+      </p:sp>
+      <p:sp>
+        <p:nvSpPr>
+          <p:cNvPr id="3" name="Content Placeholder 2"/>
+          <p:cNvSpPr>
+            <a:spLocks noGrp="1"/>
+          </p:cNvSpPr>
+          <p:nvPr>
+            <p:ph idx="1"/>
+          </p:nvPr>
+        </p:nvSpPr>
+        <p:spPr/>
+        <p:txBody>
+          <a:bodyPr/>
+          <a:lstStyle/>
+          <a:p>
+            <a:pPr marL="0" indent="0">
+              <a:buNone/>
+            </a:pPr>
+            <a:r>
+              <a:rPr lang="en-US" dirty="0" smtClean="0"/>
+              <a:t>	</a:t>
+            </a:r>
+            <a:r>
+              <a:rPr lang="en-US" dirty="0" smtClean="0"/>
+              <a:t>Select </a:t>
+            </a:r>
+            <a:r>
+              <a:rPr lang="en-US" dirty="0" err="1" smtClean="0"/>
+              <a:t>sID,sName,sizeHS</a:t>
+            </a:r>
+            <a:endParaRPr lang="en-US" dirty="0" smtClean="0"/>
+          </a:p>
+          <a:p>
+            <a:pPr marL="0" indent="0">
+              <a:buNone/>
+            </a:pPr>
+            <a:r>
+              <a:rPr lang="en-US" dirty="0"/>
+              <a:t>	</a:t>
+            </a:r>
+            <a:r>
+              <a:rPr lang="en-US" dirty="0" smtClean="0"/>
+              <a:t>from Student</a:t>
+            </a:r>
+          </a:p>
+          <a:p>
+            <a:pPr marL="0" indent="0">
+              <a:buNone/>
+            </a:pPr>
+            <a:r>
+              <a:rPr lang="en-US" dirty="0"/>
+              <a:t>	</a:t>
+            </a:r>
+            <a:r>
+              <a:rPr lang="en-US" dirty="0" smtClean="0"/>
+              <a:t>where </a:t>
+            </a:r>
+            <a:r>
+              <a:rPr lang="en-US" dirty="0" err="1" smtClean="0"/>
+              <a:t>sizeHS</a:t>
+            </a:r>
+            <a:r>
+              <a:rPr lang="en-US" dirty="0" smtClean="0"/>
+              <a:t> &gt; any (select </a:t>
+            </a:r>
+            <a:r>
+              <a:rPr lang="en-US" dirty="0" err="1" smtClean="0"/>
+              <a:t>sizeHS</a:t>
+            </a:r>
+            <a:r>
+              <a:rPr lang="en-US" dirty="0" smtClean="0"/>
+              <a:t> from Student)</a:t>
+            </a:r>
+          </a:p>
+          <a:p>
+            <a:pPr marL="0" indent="0">
+              <a:buNone/>
+            </a:pPr>
+            <a:endParaRPr lang="en-US" dirty="0" smtClean="0"/>
+          </a:p>
+          <a:p>
+            <a:pPr marL="0" indent="0">
+              <a:buNone/>
+            </a:pPr>
+            <a:endParaRPr lang="en-US" dirty="0"/>
+          </a:p>
+          <a:p>
+            <a:pPr marL="0" indent="0">
+              <a:buNone/>
+            </a:pPr>
+            <a:r>
+              <a:rPr lang="en-US" dirty="0" smtClean="0"/>
+              <a:t>	Select </a:t>
+            </a:r>
+            <a:r>
+              <a:rPr lang="en-US" dirty="0" err="1" smtClean="0"/>
+              <a:t>sID,sName,sizeHS</a:t>
+            </a:r>
+            <a:endParaRPr lang="en-US" dirty="0" smtClean="0"/>
+          </a:p>
+          <a:p>
+            <a:pPr marL="0" indent="0">
+              <a:buNone/>
+            </a:pPr>
+            <a:r>
+              <a:rPr lang="en-US" dirty="0"/>
+              <a:t>	</a:t>
+            </a:r>
+            <a:r>
+              <a:rPr lang="en-US" dirty="0" smtClean="0"/>
+              <a:t>from Student S1</a:t>
+            </a:r>
+          </a:p>
+          <a:p>
+            <a:pPr marL="0" indent="0">
+              <a:buNone/>
+            </a:pPr>
+            <a:r>
+              <a:rPr lang="en-US" dirty="0"/>
+              <a:t>	</a:t>
+            </a:r>
+            <a:r>
+              <a:rPr lang="en-US" dirty="0" smtClean="0"/>
+              <a:t>where exists (select * from Student S2 where S2.sizeHS &lt; S1.sizeHS)</a:t>
+            </a:r>
+            <a:endParaRPr lang="en-US" dirty="0"/>
+          </a:p>
+        </p:txBody>
+      </p:sp>
+    </p:spTree>
+    <p:extLst>
+      <p:ext uri="{BB962C8B-B14F-4D97-AF65-F5344CB8AC3E}">
+        <p14:creationId xmlns:p14="http://schemas.microsoft.com/office/powerpoint/2010/main" val="3809493472"/>
       </p:ext>
     </p:extLst>
   </p:cSld>
@@ -7125,6 +11264,535 @@
     <p:extLst>
       <p:ext uri="{BB962C8B-B14F-4D97-AF65-F5344CB8AC3E}">
         <p14:creationId xmlns:p14="http://schemas.microsoft.com/office/powerpoint/2010/main" val="2723774864"/>
+      </p:ext>
+    </p:extLst>
+  </p:cSld>
+  <p:clrMapOvr>
+    <a:masterClrMapping/>
+  </p:clrMapOvr>
+  <p:timing>
+    <p:tnLst>
+      <p:par>
+        <p:cTn id="1" dur="indefinite" restart="never" nodeType="tmRoot"/>
+      </p:par>
+    </p:tnLst>
+  </p:timing>
+</p:sld>
+</file>
+
+<file path=ppt/slides/slide30.xml><?xml version="1.0" encoding="utf-8"?>
+<p:sld xmlns:a="http://schemas.openxmlformats.org/drawingml/2006/main" xmlns:r="http://schemas.openxmlformats.org/officeDocument/2006/relationships" xmlns:p="http://schemas.openxmlformats.org/presentationml/2006/main">
+  <p:cSld>
+    <p:spTree>
+      <p:nvGrpSpPr>
+        <p:cNvPr id="1" name=""/>
+        <p:cNvGrpSpPr/>
+        <p:nvPr/>
+      </p:nvGrpSpPr>
+      <p:grpSpPr>
+        <a:xfrm>
+          <a:off x="0" y="0"/>
+          <a:ext cx="0" cy="0"/>
+          <a:chOff x="0" y="0"/>
+          <a:chExt cx="0" cy="0"/>
+        </a:xfrm>
+      </p:grpSpPr>
+      <p:sp>
+        <p:nvSpPr>
+          <p:cNvPr id="2" name="Title 1"/>
+          <p:cNvSpPr>
+            <a:spLocks noGrp="1"/>
+          </p:cNvSpPr>
+          <p:nvPr>
+            <p:ph type="title"/>
+          </p:nvPr>
+        </p:nvSpPr>
+        <p:spPr/>
+        <p:txBody>
+          <a:bodyPr/>
+          <a:lstStyle/>
+          <a:p>
+            <a:r>
+              <a:rPr lang="en-US" dirty="0" smtClean="0"/>
+              <a:t>Select </a:t>
+            </a:r>
+            <a:r>
+              <a:rPr lang="en-US" dirty="0" err="1" smtClean="0"/>
+              <a:t>subquery</a:t>
+            </a:r>
+            <a:r>
+              <a:rPr lang="en-US" dirty="0"/>
+              <a:t/>
+            </a:r>
+            <a:br>
+              <a:rPr lang="en-US" dirty="0"/>
+            </a:br>
+            <a:r>
+              <a:rPr lang="en-US" dirty="0" smtClean="0"/>
+              <a:t>ANY</a:t>
+            </a:r>
+            <a:endParaRPr lang="en-US" dirty="0"/>
+          </a:p>
+        </p:txBody>
+      </p:sp>
+      <p:sp>
+        <p:nvSpPr>
+          <p:cNvPr id="3" name="Content Placeholder 2"/>
+          <p:cNvSpPr>
+            <a:spLocks noGrp="1"/>
+          </p:cNvSpPr>
+          <p:nvPr>
+            <p:ph idx="1"/>
+          </p:nvPr>
+        </p:nvSpPr>
+        <p:spPr/>
+        <p:txBody>
+          <a:bodyPr/>
+          <a:lstStyle/>
+          <a:p>
+            <a:pPr marL="0" indent="0">
+              <a:buNone/>
+            </a:pPr>
+            <a:r>
+              <a:rPr lang="en-US" dirty="0" smtClean="0"/>
+              <a:t>	</a:t>
+            </a:r>
+            <a:r>
+              <a:rPr lang="en-US" dirty="0" smtClean="0"/>
+              <a:t>Select </a:t>
+            </a:r>
+            <a:r>
+              <a:rPr lang="en-US" dirty="0" err="1" smtClean="0"/>
+              <a:t>sID,sName,sizeHS</a:t>
+            </a:r>
+            <a:endParaRPr lang="en-US" dirty="0" smtClean="0"/>
+          </a:p>
+          <a:p>
+            <a:pPr marL="0" indent="0">
+              <a:buNone/>
+            </a:pPr>
+            <a:r>
+              <a:rPr lang="en-US" dirty="0"/>
+              <a:t>	</a:t>
+            </a:r>
+            <a:r>
+              <a:rPr lang="en-US" dirty="0" smtClean="0"/>
+              <a:t>from Student</a:t>
+            </a:r>
+          </a:p>
+          <a:p>
+            <a:pPr marL="0" indent="0">
+              <a:buNone/>
+            </a:pPr>
+            <a:r>
+              <a:rPr lang="en-US" dirty="0"/>
+              <a:t>	</a:t>
+            </a:r>
+            <a:r>
+              <a:rPr lang="en-US" dirty="0" smtClean="0"/>
+              <a:t>where </a:t>
+            </a:r>
+            <a:r>
+              <a:rPr lang="en-US" dirty="0" err="1" smtClean="0"/>
+              <a:t>sizeHS</a:t>
+            </a:r>
+            <a:r>
+              <a:rPr lang="en-US" dirty="0" smtClean="0"/>
+              <a:t> &gt; any (select </a:t>
+            </a:r>
+            <a:r>
+              <a:rPr lang="en-US" dirty="0" err="1" smtClean="0"/>
+              <a:t>sizeHS</a:t>
+            </a:r>
+            <a:r>
+              <a:rPr lang="en-US" dirty="0" smtClean="0"/>
+              <a:t> from Student)</a:t>
+            </a:r>
+          </a:p>
+          <a:p>
+            <a:pPr marL="0" indent="0">
+              <a:buNone/>
+            </a:pPr>
+            <a:endParaRPr lang="en-US" dirty="0" smtClean="0"/>
+          </a:p>
+          <a:p>
+            <a:pPr marL="0" indent="0">
+              <a:buNone/>
+            </a:pPr>
+            <a:endParaRPr lang="en-US" dirty="0"/>
+          </a:p>
+          <a:p>
+            <a:pPr marL="0" indent="0">
+              <a:buNone/>
+            </a:pPr>
+            <a:r>
+              <a:rPr lang="en-US" dirty="0" smtClean="0"/>
+              <a:t>	Select </a:t>
+            </a:r>
+            <a:r>
+              <a:rPr lang="en-US" dirty="0" err="1" smtClean="0"/>
+              <a:t>sID,sName,sizeHS</a:t>
+            </a:r>
+            <a:endParaRPr lang="en-US" dirty="0" smtClean="0"/>
+          </a:p>
+          <a:p>
+            <a:pPr marL="0" indent="0">
+              <a:buNone/>
+            </a:pPr>
+            <a:r>
+              <a:rPr lang="en-US" dirty="0"/>
+              <a:t>	</a:t>
+            </a:r>
+            <a:r>
+              <a:rPr lang="en-US" dirty="0" smtClean="0"/>
+              <a:t>from Student S1</a:t>
+            </a:r>
+          </a:p>
+          <a:p>
+            <a:pPr marL="0" indent="0">
+              <a:buNone/>
+            </a:pPr>
+            <a:r>
+              <a:rPr lang="en-US" dirty="0"/>
+              <a:t>	</a:t>
+            </a:r>
+            <a:r>
+              <a:rPr lang="en-US" dirty="0" smtClean="0"/>
+              <a:t>where exists (select * from Student S2 where S2.sizeHS &lt; S1.sizeHS)</a:t>
+            </a:r>
+            <a:endParaRPr lang="en-US" dirty="0"/>
+          </a:p>
+        </p:txBody>
+      </p:sp>
+    </p:spTree>
+    <p:extLst>
+      <p:ext uri="{BB962C8B-B14F-4D97-AF65-F5344CB8AC3E}">
+        <p14:creationId xmlns:p14="http://schemas.microsoft.com/office/powerpoint/2010/main" val="612868593"/>
+      </p:ext>
+    </p:extLst>
+  </p:cSld>
+  <p:clrMapOvr>
+    <a:masterClrMapping/>
+  </p:clrMapOvr>
+  <p:timing>
+    <p:tnLst>
+      <p:par>
+        <p:cTn id="1" dur="indefinite" restart="never" nodeType="tmRoot"/>
+      </p:par>
+    </p:tnLst>
+  </p:timing>
+</p:sld>
+</file>
+
+<file path=ppt/slides/slide31.xml><?xml version="1.0" encoding="utf-8"?>
+<p:sld xmlns:a="http://schemas.openxmlformats.org/drawingml/2006/main" xmlns:r="http://schemas.openxmlformats.org/officeDocument/2006/relationships" xmlns:p="http://schemas.openxmlformats.org/presentationml/2006/main">
+  <p:cSld>
+    <p:spTree>
+      <p:nvGrpSpPr>
+        <p:cNvPr id="1" name=""/>
+        <p:cNvGrpSpPr/>
+        <p:nvPr/>
+      </p:nvGrpSpPr>
+      <p:grpSpPr>
+        <a:xfrm>
+          <a:off x="0" y="0"/>
+          <a:ext cx="0" cy="0"/>
+          <a:chOff x="0" y="0"/>
+          <a:chExt cx="0" cy="0"/>
+        </a:xfrm>
+      </p:grpSpPr>
+      <p:sp>
+        <p:nvSpPr>
+          <p:cNvPr id="2" name="Title 1"/>
+          <p:cNvSpPr>
+            <a:spLocks noGrp="1"/>
+          </p:cNvSpPr>
+          <p:nvPr>
+            <p:ph type="title"/>
+          </p:nvPr>
+        </p:nvSpPr>
+        <p:spPr/>
+        <p:txBody>
+          <a:bodyPr/>
+          <a:lstStyle/>
+          <a:p>
+            <a:r>
+              <a:rPr lang="en-US" dirty="0" smtClean="0"/>
+              <a:t>Select </a:t>
+            </a:r>
+            <a:r>
+              <a:rPr lang="en-US" dirty="0" err="1" smtClean="0"/>
+              <a:t>subquery</a:t>
+            </a:r>
+            <a:r>
+              <a:rPr lang="en-US" dirty="0"/>
+              <a:t/>
+            </a:r>
+            <a:br>
+              <a:rPr lang="en-US" dirty="0"/>
+            </a:br>
+            <a:r>
+              <a:rPr lang="en-US" dirty="0" smtClean="0"/>
+              <a:t>EXCEPT</a:t>
+            </a:r>
+            <a:endParaRPr lang="en-US" dirty="0"/>
+          </a:p>
+        </p:txBody>
+      </p:sp>
+      <p:sp>
+        <p:nvSpPr>
+          <p:cNvPr id="3" name="Content Placeholder 2"/>
+          <p:cNvSpPr>
+            <a:spLocks noGrp="1"/>
+          </p:cNvSpPr>
+          <p:nvPr>
+            <p:ph idx="1"/>
+          </p:nvPr>
+        </p:nvSpPr>
+        <p:spPr/>
+        <p:txBody>
+          <a:bodyPr/>
+          <a:lstStyle/>
+          <a:p>
+            <a:pPr marL="0" indent="0">
+              <a:buNone/>
+            </a:pPr>
+            <a:r>
+              <a:rPr lang="ru-RU" dirty="0" smtClean="0"/>
+              <a:t>	Вывести студентов, которые подали документы на </a:t>
+            </a:r>
+            <a:r>
+              <a:rPr lang="en-US" dirty="0" smtClean="0"/>
+              <a:t>‘CS’, </a:t>
+            </a:r>
+            <a:r>
+              <a:rPr lang="ru-RU" dirty="0" smtClean="0"/>
+              <a:t>но не подавали на </a:t>
+            </a:r>
+            <a:r>
+              <a:rPr lang="en-US" dirty="0" smtClean="0"/>
+              <a:t>‘EE’</a:t>
+            </a:r>
+          </a:p>
+        </p:txBody>
+      </p:sp>
+    </p:spTree>
+    <p:extLst>
+      <p:ext uri="{BB962C8B-B14F-4D97-AF65-F5344CB8AC3E}">
+        <p14:creationId xmlns:p14="http://schemas.microsoft.com/office/powerpoint/2010/main" val="1634393624"/>
+      </p:ext>
+    </p:extLst>
+  </p:cSld>
+  <p:clrMapOvr>
+    <a:masterClrMapping/>
+  </p:clrMapOvr>
+  <p:timing>
+    <p:tnLst>
+      <p:par>
+        <p:cTn id="1" dur="indefinite" restart="never" nodeType="tmRoot"/>
+      </p:par>
+    </p:tnLst>
+  </p:timing>
+</p:sld>
+</file>
+
+<file path=ppt/slides/slide32.xml><?xml version="1.0" encoding="utf-8"?>
+<p:sld xmlns:a="http://schemas.openxmlformats.org/drawingml/2006/main" xmlns:r="http://schemas.openxmlformats.org/officeDocument/2006/relationships" xmlns:p="http://schemas.openxmlformats.org/presentationml/2006/main">
+  <p:cSld>
+    <p:spTree>
+      <p:nvGrpSpPr>
+        <p:cNvPr id="1" name=""/>
+        <p:cNvGrpSpPr/>
+        <p:nvPr/>
+      </p:nvGrpSpPr>
+      <p:grpSpPr>
+        <a:xfrm>
+          <a:off x="0" y="0"/>
+          <a:ext cx="0" cy="0"/>
+          <a:chOff x="0" y="0"/>
+          <a:chExt cx="0" cy="0"/>
+        </a:xfrm>
+      </p:grpSpPr>
+      <p:sp>
+        <p:nvSpPr>
+          <p:cNvPr id="2" name="Title 1"/>
+          <p:cNvSpPr>
+            <a:spLocks noGrp="1"/>
+          </p:cNvSpPr>
+          <p:nvPr>
+            <p:ph type="title"/>
+          </p:nvPr>
+        </p:nvSpPr>
+        <p:spPr/>
+        <p:txBody>
+          <a:bodyPr/>
+          <a:lstStyle/>
+          <a:p>
+            <a:r>
+              <a:rPr lang="en-US" dirty="0" smtClean="0"/>
+              <a:t>Select </a:t>
+            </a:r>
+            <a:r>
+              <a:rPr lang="en-US" dirty="0" err="1" smtClean="0"/>
+              <a:t>subquery</a:t>
+            </a:r>
+            <a:r>
+              <a:rPr lang="en-US" dirty="0"/>
+              <a:t/>
+            </a:r>
+            <a:br>
+              <a:rPr lang="en-US" dirty="0"/>
+            </a:br>
+            <a:r>
+              <a:rPr lang="en-US" dirty="0" smtClean="0"/>
+              <a:t>EXCEPT</a:t>
+            </a:r>
+            <a:endParaRPr lang="en-US" dirty="0"/>
+          </a:p>
+        </p:txBody>
+      </p:sp>
+      <p:sp>
+        <p:nvSpPr>
+          <p:cNvPr id="3" name="Content Placeholder 2"/>
+          <p:cNvSpPr>
+            <a:spLocks noGrp="1"/>
+          </p:cNvSpPr>
+          <p:nvPr>
+            <p:ph idx="1"/>
+          </p:nvPr>
+        </p:nvSpPr>
+        <p:spPr/>
+        <p:txBody>
+          <a:bodyPr/>
+          <a:lstStyle/>
+          <a:p>
+            <a:pPr marL="0" indent="0">
+              <a:buNone/>
+            </a:pPr>
+            <a:r>
+              <a:rPr lang="en-US" dirty="0" smtClean="0"/>
+              <a:t>	</a:t>
+            </a:r>
+            <a:r>
+              <a:rPr lang="en-US" dirty="0" smtClean="0"/>
+              <a:t>select </a:t>
+            </a:r>
+            <a:r>
+              <a:rPr lang="en-US" dirty="0" err="1" smtClean="0"/>
+              <a:t>sID</a:t>
+            </a:r>
+            <a:r>
+              <a:rPr lang="en-US" dirty="0" smtClean="0"/>
+              <a:t>, </a:t>
+            </a:r>
+            <a:r>
+              <a:rPr lang="en-US" dirty="0" err="1" smtClean="0"/>
+              <a:t>sName</a:t>
+            </a:r>
+            <a:endParaRPr lang="en-US" dirty="0" smtClean="0"/>
+          </a:p>
+          <a:p>
+            <a:pPr marL="0" indent="0">
+              <a:buNone/>
+            </a:pPr>
+            <a:r>
+              <a:rPr lang="en-US" dirty="0" smtClean="0"/>
+              <a:t>	</a:t>
+            </a:r>
+            <a:r>
+              <a:rPr lang="en-US" dirty="0" smtClean="0"/>
+              <a:t>from </a:t>
+            </a:r>
+            <a:r>
+              <a:rPr lang="en-US" dirty="0" err="1" smtClean="0"/>
+              <a:t>StudenT</a:t>
+            </a:r>
+            <a:endParaRPr lang="en-US" dirty="0" smtClean="0"/>
+          </a:p>
+          <a:p>
+            <a:pPr marL="0" indent="0">
+              <a:buNone/>
+            </a:pPr>
+            <a:r>
+              <a:rPr lang="en-US" dirty="0" smtClean="0"/>
+              <a:t>	</a:t>
+            </a:r>
+            <a:r>
+              <a:rPr lang="en-US" dirty="0" smtClean="0"/>
+              <a:t>where </a:t>
+            </a:r>
+            <a:r>
+              <a:rPr lang="en-US" dirty="0" err="1" smtClean="0"/>
+              <a:t>sID</a:t>
+            </a:r>
+            <a:r>
+              <a:rPr lang="en-US" dirty="0" smtClean="0"/>
+              <a:t> in (select </a:t>
+            </a:r>
+            <a:r>
+              <a:rPr lang="en-US" dirty="0" err="1" smtClean="0"/>
+              <a:t>sID</a:t>
+            </a:r>
+            <a:r>
+              <a:rPr lang="en-US" dirty="0" smtClean="0"/>
+              <a:t> from Apply where major = ‘CS’)</a:t>
+            </a:r>
+          </a:p>
+          <a:p>
+            <a:pPr marL="0" indent="0">
+              <a:buNone/>
+            </a:pPr>
+            <a:r>
+              <a:rPr lang="en-US" dirty="0"/>
+              <a:t>	</a:t>
+            </a:r>
+            <a:r>
+              <a:rPr lang="en-US" dirty="0" smtClean="0"/>
+              <a:t>	and </a:t>
+            </a:r>
+            <a:r>
+              <a:rPr lang="en-US" dirty="0" err="1" smtClean="0"/>
+              <a:t>sID</a:t>
+            </a:r>
+            <a:r>
+              <a:rPr lang="en-US" dirty="0" smtClean="0"/>
+              <a:t> not in (select </a:t>
+            </a:r>
+            <a:r>
+              <a:rPr lang="en-US" dirty="0" err="1" smtClean="0"/>
+              <a:t>sID</a:t>
+            </a:r>
+            <a:r>
+              <a:rPr lang="en-US" dirty="0" smtClean="0"/>
+              <a:t> from Apply where major = ‘EE’)</a:t>
+            </a:r>
+          </a:p>
+          <a:p>
+            <a:pPr marL="0" indent="0">
+              <a:buNone/>
+            </a:pPr>
+            <a:endParaRPr lang="en-US" dirty="0"/>
+          </a:p>
+          <a:p>
+            <a:pPr marL="0" indent="0">
+              <a:buNone/>
+            </a:pPr>
+            <a:r>
+              <a:rPr lang="ru-RU" dirty="0" smtClean="0"/>
+              <a:t>Перепишите с помощью </a:t>
+            </a:r>
+            <a:r>
+              <a:rPr lang="en-US" dirty="0" smtClean="0"/>
+              <a:t>ANY</a:t>
+            </a:r>
+            <a:endParaRPr lang="en-US" dirty="0"/>
+          </a:p>
+        </p:txBody>
+      </p:sp>
+    </p:spTree>
+    <p:extLst>
+      <p:ext uri="{BB962C8B-B14F-4D97-AF65-F5344CB8AC3E}">
+        <p14:creationId xmlns:p14="http://schemas.microsoft.com/office/powerpoint/2010/main" val="4077488058"/>
       </p:ext>
     </p:extLst>
   </p:cSld>
@@ -8724,7 +13392,81 @@
             </a:r>
             <a:r>
               <a:rPr lang="en-US" dirty="0" smtClean="0"/>
-              <a:t> and major = ‘History’</a:t>
+              <a:t> and major = ‘History</a:t>
+            </a:r>
+            <a:r>
+              <a:rPr lang="en-US" dirty="0" smtClean="0"/>
+              <a:t>’</a:t>
+            </a:r>
+          </a:p>
+          <a:p>
+            <a:pPr marL="0" indent="0">
+              <a:buNone/>
+            </a:pPr>
+            <a:endParaRPr lang="en-US" dirty="0"/>
+          </a:p>
+          <a:p>
+            <a:pPr marL="0" indent="0">
+              <a:buNone/>
+            </a:pPr>
+            <a:r>
+              <a:rPr lang="en-US" dirty="0" smtClean="0"/>
+              <a:t>		select </a:t>
+            </a:r>
+            <a:r>
+              <a:rPr lang="en-US" dirty="0" err="1" smtClean="0"/>
+              <a:t>sID</a:t>
+            </a:r>
+            <a:r>
+              <a:rPr lang="en-US" dirty="0" smtClean="0"/>
+              <a:t>, </a:t>
+            </a:r>
+            <a:r>
+              <a:rPr lang="en-US" dirty="0" err="1" smtClean="0"/>
+              <a:t>sName</a:t>
+            </a:r>
+            <a:endParaRPr lang="en-US" dirty="0" smtClean="0"/>
+          </a:p>
+          <a:p>
+            <a:pPr marL="0" indent="0">
+              <a:buNone/>
+            </a:pPr>
+            <a:r>
+              <a:rPr lang="en-US" dirty="0"/>
+              <a:t>	</a:t>
+            </a:r>
+            <a:r>
+              <a:rPr lang="en-US" dirty="0" smtClean="0"/>
+              <a:t>	from Student</a:t>
+            </a:r>
+          </a:p>
+          <a:p>
+            <a:pPr marL="0" indent="0">
+              <a:buNone/>
+            </a:pPr>
+            <a:r>
+              <a:rPr lang="en-US" dirty="0"/>
+              <a:t>	</a:t>
+            </a:r>
+            <a:r>
+              <a:rPr lang="en-US" dirty="0" smtClean="0"/>
+              <a:t>	where </a:t>
+            </a:r>
+            <a:r>
+              <a:rPr lang="en-US" dirty="0" err="1" smtClean="0"/>
+              <a:t>sID</a:t>
+            </a:r>
+            <a:r>
+              <a:rPr lang="en-US" dirty="0" smtClean="0"/>
+              <a:t> in (select </a:t>
+            </a:r>
+            <a:r>
+              <a:rPr lang="en-US" dirty="0" err="1" smtClean="0"/>
+              <a:t>sID</a:t>
+            </a:r>
+            <a:r>
+              <a:rPr lang="en-US" dirty="0" smtClean="0"/>
+              <a:t> from Apply where major = ‘History’)</a:t>
             </a:r>
             <a:endParaRPr lang="en-US" dirty="0"/>
           </a:p>

</xml_diff>